<commit_message>
changes in Azure networking ppt
</commit_message>
<xml_diff>
--- a/azure-in-depth/Day-5-Azure-Networking/01-Azure-Networking.pptx
+++ b/azure-in-depth/Day-5-Azure-Networking/01-Azure-Networking.pptx
@@ -5,17 +5,23 @@
     <p:sldMasterId id="2147483693" r:id="rId4"/>
   </p:sldMasterIdLst>
   <p:notesMasterIdLst>
-    <p:notesMasterId r:id="rId10"/>
+    <p:notesMasterId r:id="rId16"/>
   </p:notesMasterIdLst>
   <p:handoutMasterIdLst>
-    <p:handoutMasterId r:id="rId11"/>
+    <p:handoutMasterId r:id="rId17"/>
   </p:handoutMasterIdLst>
   <p:sldIdLst>
     <p:sldId id="312" r:id="rId5"/>
     <p:sldId id="304" r:id="rId6"/>
     <p:sldId id="322" r:id="rId7"/>
-    <p:sldId id="334" r:id="rId8"/>
-    <p:sldId id="297" r:id="rId9"/>
+    <p:sldId id="337" r:id="rId8"/>
+    <p:sldId id="335" r:id="rId9"/>
+    <p:sldId id="338" r:id="rId10"/>
+    <p:sldId id="339" r:id="rId11"/>
+    <p:sldId id="340" r:id="rId12"/>
+    <p:sldId id="336" r:id="rId13"/>
+    <p:sldId id="334" r:id="rId14"/>
+    <p:sldId id="297" r:id="rId15"/>
   </p:sldIdLst>
   <p:sldSz cx="12192000" cy="6858000"/>
   <p:notesSz cx="13716000" cy="24384000"/>
@@ -621,6 +627,172 @@
 </p:notes>
 </file>
 
+<file path=ppt/notesSlides/notesSlide10.xml><?xml version="1.0" encoding="utf-8"?>
+<p:notes xmlns:a="http://schemas.openxmlformats.org/drawingml/2006/main" xmlns:r="http://schemas.openxmlformats.org/officeDocument/2006/relationships" xmlns:p="http://schemas.openxmlformats.org/presentationml/2006/main">
+  <p:cSld>
+    <p:spTree>
+      <p:nvGrpSpPr>
+        <p:cNvPr id="1" name=""/>
+        <p:cNvGrpSpPr/>
+        <p:nvPr/>
+      </p:nvGrpSpPr>
+      <p:grpSpPr>
+        <a:xfrm>
+          <a:off x="0" y="0"/>
+          <a:ext cx="0" cy="0"/>
+          <a:chOff x="0" y="0"/>
+          <a:chExt cx="0" cy="0"/>
+        </a:xfrm>
+      </p:grpSpPr>
+      <p:sp>
+        <p:nvSpPr>
+          <p:cNvPr id="2" name="Slide Image Placeholder 1"/>
+          <p:cNvSpPr>
+            <a:spLocks noGrp="1" noRot="1" noChangeAspect="1"/>
+          </p:cNvSpPr>
+          <p:nvPr>
+            <p:ph type="sldImg"/>
+          </p:nvPr>
+        </p:nvSpPr>
+        <p:spPr>
+          <a:xfrm>
+            <a:off x="-457200" y="3048000"/>
+            <a:ext cx="14630400" cy="8229600"/>
+          </a:xfrm>
+          <a:prstGeom prst="rect">
+            <a:avLst/>
+          </a:prstGeom>
+          <a:noFill/>
+          <a:ln w="12700">
+            <a:solidFill>
+              <a:prstClr val="black"/>
+            </a:solidFill>
+          </a:ln>
+        </p:spPr>
+      </p:sp>
+      <p:sp>
+        <p:nvSpPr>
+          <p:cNvPr id="3" name="Notes Placeholder 2"/>
+          <p:cNvSpPr>
+            <a:spLocks noGrp="1"/>
+          </p:cNvSpPr>
+          <p:nvPr>
+            <p:ph type="body" idx="1"/>
+          </p:nvPr>
+        </p:nvSpPr>
+        <p:spPr>
+          <a:xfrm>
+            <a:off x="1371600" y="11734800"/>
+            <a:ext cx="10972800" cy="9601200"/>
+          </a:xfrm>
+          <a:prstGeom prst="rect">
+            <a:avLst/>
+          </a:prstGeom>
+        </p:spPr>
+        <p:txBody>
+          <a:bodyPr/>
+          <a:lstStyle/>
+          <a:p>
+            <a:endParaRPr lang="en-US" dirty="0"/>
+          </a:p>
+        </p:txBody>
+      </p:sp>
+    </p:spTree>
+    <p:extLst>
+      <p:ext uri="{BB962C8B-B14F-4D97-AF65-F5344CB8AC3E}">
+        <p14:creationId xmlns:p14="http://schemas.microsoft.com/office/powerpoint/2010/main" val="4163711466"/>
+      </p:ext>
+    </p:extLst>
+  </p:cSld>
+  <p:clrMapOvr>
+    <a:masterClrMapping/>
+  </p:clrMapOvr>
+</p:notes>
+</file>
+
+<file path=ppt/notesSlides/notesSlide11.xml><?xml version="1.0" encoding="utf-8"?>
+<p:notes xmlns:a="http://schemas.openxmlformats.org/drawingml/2006/main" xmlns:r="http://schemas.openxmlformats.org/officeDocument/2006/relationships" xmlns:p="http://schemas.openxmlformats.org/presentationml/2006/main">
+  <p:cSld>
+    <p:spTree>
+      <p:nvGrpSpPr>
+        <p:cNvPr id="1" name=""/>
+        <p:cNvGrpSpPr/>
+        <p:nvPr/>
+      </p:nvGrpSpPr>
+      <p:grpSpPr>
+        <a:xfrm>
+          <a:off x="0" y="0"/>
+          <a:ext cx="0" cy="0"/>
+          <a:chOff x="0" y="0"/>
+          <a:chExt cx="0" cy="0"/>
+        </a:xfrm>
+      </p:grpSpPr>
+      <p:sp>
+        <p:nvSpPr>
+          <p:cNvPr id="2" name="Slide Image Placeholder 1"/>
+          <p:cNvSpPr>
+            <a:spLocks noGrp="1" noRot="1" noChangeAspect="1"/>
+          </p:cNvSpPr>
+          <p:nvPr>
+            <p:ph type="sldImg"/>
+          </p:nvPr>
+        </p:nvSpPr>
+        <p:spPr>
+          <a:xfrm>
+            <a:off x="-457200" y="3048000"/>
+            <a:ext cx="14630400" cy="8229600"/>
+          </a:xfrm>
+          <a:prstGeom prst="rect">
+            <a:avLst/>
+          </a:prstGeom>
+          <a:noFill/>
+          <a:ln w="12700">
+            <a:solidFill>
+              <a:prstClr val="black"/>
+            </a:solidFill>
+          </a:ln>
+        </p:spPr>
+      </p:sp>
+      <p:sp>
+        <p:nvSpPr>
+          <p:cNvPr id="3" name="Notes Placeholder 2"/>
+          <p:cNvSpPr>
+            <a:spLocks noGrp="1"/>
+          </p:cNvSpPr>
+          <p:nvPr>
+            <p:ph type="body" idx="1"/>
+          </p:nvPr>
+        </p:nvSpPr>
+        <p:spPr>
+          <a:xfrm>
+            <a:off x="1371600" y="11734800"/>
+            <a:ext cx="10972800" cy="9601200"/>
+          </a:xfrm>
+          <a:prstGeom prst="rect">
+            <a:avLst/>
+          </a:prstGeom>
+        </p:spPr>
+        <p:txBody>
+          <a:bodyPr/>
+          <a:lstStyle/>
+          <a:p>
+            <a:endParaRPr lang="en-US" dirty="0"/>
+          </a:p>
+        </p:txBody>
+      </p:sp>
+    </p:spTree>
+    <p:extLst>
+      <p:ext uri="{BB962C8B-B14F-4D97-AF65-F5344CB8AC3E}">
+        <p14:creationId xmlns:p14="http://schemas.microsoft.com/office/powerpoint/2010/main" val="931307476"/>
+      </p:ext>
+    </p:extLst>
+  </p:cSld>
+  <p:clrMapOvr>
+    <a:masterClrMapping/>
+  </p:clrMapOvr>
+</p:notes>
+</file>
+
 <file path=ppt/notesSlides/notesSlide2.xml><?xml version="1.0" encoding="utf-8"?>
 <p:notes xmlns:a="http://schemas.openxmlformats.org/drawingml/2006/main" xmlns:r="http://schemas.openxmlformats.org/officeDocument/2006/relationships" xmlns:p="http://schemas.openxmlformats.org/presentationml/2006/main">
   <p:cSld>
@@ -860,7 +1032,7 @@
     </p:spTree>
     <p:extLst>
       <p:ext uri="{BB962C8B-B14F-4D97-AF65-F5344CB8AC3E}">
-        <p14:creationId xmlns:p14="http://schemas.microsoft.com/office/powerpoint/2010/main" val="4163711466"/>
+        <p14:creationId xmlns:p14="http://schemas.microsoft.com/office/powerpoint/2010/main" val="1543512583"/>
       </p:ext>
     </p:extLst>
   </p:cSld>
@@ -943,7 +1115,339 @@
     </p:spTree>
     <p:extLst>
       <p:ext uri="{BB962C8B-B14F-4D97-AF65-F5344CB8AC3E}">
-        <p14:creationId xmlns:p14="http://schemas.microsoft.com/office/powerpoint/2010/main" val="931307476"/>
+        <p14:creationId xmlns:p14="http://schemas.microsoft.com/office/powerpoint/2010/main" val="1635194193"/>
+      </p:ext>
+    </p:extLst>
+  </p:cSld>
+  <p:clrMapOvr>
+    <a:masterClrMapping/>
+  </p:clrMapOvr>
+</p:notes>
+</file>
+
+<file path=ppt/notesSlides/notesSlide6.xml><?xml version="1.0" encoding="utf-8"?>
+<p:notes xmlns:a="http://schemas.openxmlformats.org/drawingml/2006/main" xmlns:r="http://schemas.openxmlformats.org/officeDocument/2006/relationships" xmlns:p="http://schemas.openxmlformats.org/presentationml/2006/main">
+  <p:cSld>
+    <p:spTree>
+      <p:nvGrpSpPr>
+        <p:cNvPr id="1" name=""/>
+        <p:cNvGrpSpPr/>
+        <p:nvPr/>
+      </p:nvGrpSpPr>
+      <p:grpSpPr>
+        <a:xfrm>
+          <a:off x="0" y="0"/>
+          <a:ext cx="0" cy="0"/>
+          <a:chOff x="0" y="0"/>
+          <a:chExt cx="0" cy="0"/>
+        </a:xfrm>
+      </p:grpSpPr>
+      <p:sp>
+        <p:nvSpPr>
+          <p:cNvPr id="2" name="Slide Image Placeholder 1"/>
+          <p:cNvSpPr>
+            <a:spLocks noGrp="1" noRot="1" noChangeAspect="1"/>
+          </p:cNvSpPr>
+          <p:nvPr>
+            <p:ph type="sldImg"/>
+          </p:nvPr>
+        </p:nvSpPr>
+        <p:spPr>
+          <a:xfrm>
+            <a:off x="-457200" y="3048000"/>
+            <a:ext cx="14630400" cy="8229600"/>
+          </a:xfrm>
+          <a:prstGeom prst="rect">
+            <a:avLst/>
+          </a:prstGeom>
+          <a:noFill/>
+          <a:ln w="12700">
+            <a:solidFill>
+              <a:prstClr val="black"/>
+            </a:solidFill>
+          </a:ln>
+        </p:spPr>
+      </p:sp>
+      <p:sp>
+        <p:nvSpPr>
+          <p:cNvPr id="3" name="Notes Placeholder 2"/>
+          <p:cNvSpPr>
+            <a:spLocks noGrp="1"/>
+          </p:cNvSpPr>
+          <p:nvPr>
+            <p:ph type="body" idx="1"/>
+          </p:nvPr>
+        </p:nvSpPr>
+        <p:spPr>
+          <a:xfrm>
+            <a:off x="1371600" y="11734800"/>
+            <a:ext cx="10972800" cy="9601200"/>
+          </a:xfrm>
+          <a:prstGeom prst="rect">
+            <a:avLst/>
+          </a:prstGeom>
+        </p:spPr>
+        <p:txBody>
+          <a:bodyPr/>
+          <a:lstStyle/>
+          <a:p>
+            <a:endParaRPr lang="en-US" dirty="0"/>
+          </a:p>
+        </p:txBody>
+      </p:sp>
+    </p:spTree>
+    <p:extLst>
+      <p:ext uri="{BB962C8B-B14F-4D97-AF65-F5344CB8AC3E}">
+        <p14:creationId xmlns:p14="http://schemas.microsoft.com/office/powerpoint/2010/main" val="1229688375"/>
+      </p:ext>
+    </p:extLst>
+  </p:cSld>
+  <p:clrMapOvr>
+    <a:masterClrMapping/>
+  </p:clrMapOvr>
+</p:notes>
+</file>
+
+<file path=ppt/notesSlides/notesSlide7.xml><?xml version="1.0" encoding="utf-8"?>
+<p:notes xmlns:a="http://schemas.openxmlformats.org/drawingml/2006/main" xmlns:r="http://schemas.openxmlformats.org/officeDocument/2006/relationships" xmlns:p="http://schemas.openxmlformats.org/presentationml/2006/main">
+  <p:cSld>
+    <p:spTree>
+      <p:nvGrpSpPr>
+        <p:cNvPr id="1" name=""/>
+        <p:cNvGrpSpPr/>
+        <p:nvPr/>
+      </p:nvGrpSpPr>
+      <p:grpSpPr>
+        <a:xfrm>
+          <a:off x="0" y="0"/>
+          <a:ext cx="0" cy="0"/>
+          <a:chOff x="0" y="0"/>
+          <a:chExt cx="0" cy="0"/>
+        </a:xfrm>
+      </p:grpSpPr>
+      <p:sp>
+        <p:nvSpPr>
+          <p:cNvPr id="2" name="Slide Image Placeholder 1"/>
+          <p:cNvSpPr>
+            <a:spLocks noGrp="1" noRot="1" noChangeAspect="1"/>
+          </p:cNvSpPr>
+          <p:nvPr>
+            <p:ph type="sldImg"/>
+          </p:nvPr>
+        </p:nvSpPr>
+        <p:spPr>
+          <a:xfrm>
+            <a:off x="-457200" y="3048000"/>
+            <a:ext cx="14630400" cy="8229600"/>
+          </a:xfrm>
+          <a:prstGeom prst="rect">
+            <a:avLst/>
+          </a:prstGeom>
+          <a:noFill/>
+          <a:ln w="12700">
+            <a:solidFill>
+              <a:prstClr val="black"/>
+            </a:solidFill>
+          </a:ln>
+        </p:spPr>
+      </p:sp>
+      <p:sp>
+        <p:nvSpPr>
+          <p:cNvPr id="3" name="Notes Placeholder 2"/>
+          <p:cNvSpPr>
+            <a:spLocks noGrp="1"/>
+          </p:cNvSpPr>
+          <p:nvPr>
+            <p:ph type="body" idx="1"/>
+          </p:nvPr>
+        </p:nvSpPr>
+        <p:spPr>
+          <a:xfrm>
+            <a:off x="1371600" y="11734800"/>
+            <a:ext cx="10972800" cy="9601200"/>
+          </a:xfrm>
+          <a:prstGeom prst="rect">
+            <a:avLst/>
+          </a:prstGeom>
+        </p:spPr>
+        <p:txBody>
+          <a:bodyPr/>
+          <a:lstStyle/>
+          <a:p>
+            <a:endParaRPr lang="en-US" dirty="0"/>
+          </a:p>
+        </p:txBody>
+      </p:sp>
+    </p:spTree>
+    <p:extLst>
+      <p:ext uri="{BB962C8B-B14F-4D97-AF65-F5344CB8AC3E}">
+        <p14:creationId xmlns:p14="http://schemas.microsoft.com/office/powerpoint/2010/main" val="1327776061"/>
+      </p:ext>
+    </p:extLst>
+  </p:cSld>
+  <p:clrMapOvr>
+    <a:masterClrMapping/>
+  </p:clrMapOvr>
+</p:notes>
+</file>
+
+<file path=ppt/notesSlides/notesSlide8.xml><?xml version="1.0" encoding="utf-8"?>
+<p:notes xmlns:a="http://schemas.openxmlformats.org/drawingml/2006/main" xmlns:r="http://schemas.openxmlformats.org/officeDocument/2006/relationships" xmlns:p="http://schemas.openxmlformats.org/presentationml/2006/main">
+  <p:cSld>
+    <p:spTree>
+      <p:nvGrpSpPr>
+        <p:cNvPr id="1" name=""/>
+        <p:cNvGrpSpPr/>
+        <p:nvPr/>
+      </p:nvGrpSpPr>
+      <p:grpSpPr>
+        <a:xfrm>
+          <a:off x="0" y="0"/>
+          <a:ext cx="0" cy="0"/>
+          <a:chOff x="0" y="0"/>
+          <a:chExt cx="0" cy="0"/>
+        </a:xfrm>
+      </p:grpSpPr>
+      <p:sp>
+        <p:nvSpPr>
+          <p:cNvPr id="2" name="Slide Image Placeholder 1"/>
+          <p:cNvSpPr>
+            <a:spLocks noGrp="1" noRot="1" noChangeAspect="1"/>
+          </p:cNvSpPr>
+          <p:nvPr>
+            <p:ph type="sldImg"/>
+          </p:nvPr>
+        </p:nvSpPr>
+        <p:spPr>
+          <a:xfrm>
+            <a:off x="-457200" y="3048000"/>
+            <a:ext cx="14630400" cy="8229600"/>
+          </a:xfrm>
+          <a:prstGeom prst="rect">
+            <a:avLst/>
+          </a:prstGeom>
+          <a:noFill/>
+          <a:ln w="12700">
+            <a:solidFill>
+              <a:prstClr val="black"/>
+            </a:solidFill>
+          </a:ln>
+        </p:spPr>
+      </p:sp>
+      <p:sp>
+        <p:nvSpPr>
+          <p:cNvPr id="3" name="Notes Placeholder 2"/>
+          <p:cNvSpPr>
+            <a:spLocks noGrp="1"/>
+          </p:cNvSpPr>
+          <p:nvPr>
+            <p:ph type="body" idx="1"/>
+          </p:nvPr>
+        </p:nvSpPr>
+        <p:spPr>
+          <a:xfrm>
+            <a:off x="1371600" y="11734800"/>
+            <a:ext cx="10972800" cy="9601200"/>
+          </a:xfrm>
+          <a:prstGeom prst="rect">
+            <a:avLst/>
+          </a:prstGeom>
+        </p:spPr>
+        <p:txBody>
+          <a:bodyPr/>
+          <a:lstStyle/>
+          <a:p>
+            <a:endParaRPr lang="en-US" dirty="0"/>
+          </a:p>
+        </p:txBody>
+      </p:sp>
+    </p:spTree>
+    <p:extLst>
+      <p:ext uri="{BB962C8B-B14F-4D97-AF65-F5344CB8AC3E}">
+        <p14:creationId xmlns:p14="http://schemas.microsoft.com/office/powerpoint/2010/main" val="900755096"/>
+      </p:ext>
+    </p:extLst>
+  </p:cSld>
+  <p:clrMapOvr>
+    <a:masterClrMapping/>
+  </p:clrMapOvr>
+</p:notes>
+</file>
+
+<file path=ppt/notesSlides/notesSlide9.xml><?xml version="1.0" encoding="utf-8"?>
+<p:notes xmlns:a="http://schemas.openxmlformats.org/drawingml/2006/main" xmlns:r="http://schemas.openxmlformats.org/officeDocument/2006/relationships" xmlns:p="http://schemas.openxmlformats.org/presentationml/2006/main">
+  <p:cSld>
+    <p:spTree>
+      <p:nvGrpSpPr>
+        <p:cNvPr id="1" name=""/>
+        <p:cNvGrpSpPr/>
+        <p:nvPr/>
+      </p:nvGrpSpPr>
+      <p:grpSpPr>
+        <a:xfrm>
+          <a:off x="0" y="0"/>
+          <a:ext cx="0" cy="0"/>
+          <a:chOff x="0" y="0"/>
+          <a:chExt cx="0" cy="0"/>
+        </a:xfrm>
+      </p:grpSpPr>
+      <p:sp>
+        <p:nvSpPr>
+          <p:cNvPr id="2" name="Slide Image Placeholder 1"/>
+          <p:cNvSpPr>
+            <a:spLocks noGrp="1" noRot="1" noChangeAspect="1"/>
+          </p:cNvSpPr>
+          <p:nvPr>
+            <p:ph type="sldImg"/>
+          </p:nvPr>
+        </p:nvSpPr>
+        <p:spPr>
+          <a:xfrm>
+            <a:off x="-457200" y="3048000"/>
+            <a:ext cx="14630400" cy="8229600"/>
+          </a:xfrm>
+          <a:prstGeom prst="rect">
+            <a:avLst/>
+          </a:prstGeom>
+          <a:noFill/>
+          <a:ln w="12700">
+            <a:solidFill>
+              <a:prstClr val="black"/>
+            </a:solidFill>
+          </a:ln>
+        </p:spPr>
+      </p:sp>
+      <p:sp>
+        <p:nvSpPr>
+          <p:cNvPr id="3" name="Notes Placeholder 2"/>
+          <p:cNvSpPr>
+            <a:spLocks noGrp="1"/>
+          </p:cNvSpPr>
+          <p:nvPr>
+            <p:ph type="body" idx="1"/>
+          </p:nvPr>
+        </p:nvSpPr>
+        <p:spPr>
+          <a:xfrm>
+            <a:off x="1371600" y="11734800"/>
+            <a:ext cx="10972800" cy="9601200"/>
+          </a:xfrm>
+          <a:prstGeom prst="rect">
+            <a:avLst/>
+          </a:prstGeom>
+        </p:spPr>
+        <p:txBody>
+          <a:bodyPr/>
+          <a:lstStyle/>
+          <a:p>
+            <a:endParaRPr lang="en-US" dirty="0"/>
+          </a:p>
+        </p:txBody>
+      </p:sp>
+    </p:spTree>
+    <p:extLst>
+      <p:ext uri="{BB962C8B-B14F-4D97-AF65-F5344CB8AC3E}">
+        <p14:creationId xmlns:p14="http://schemas.microsoft.com/office/powerpoint/2010/main" val="1485853355"/>
       </p:ext>
     </p:extLst>
   </p:cSld>
@@ -1676,7 +2180,7 @@
             <a:fld id="{B61BEF0D-F0BB-DE4B-95CE-6DB70DBA9567}" type="datetimeFigureOut">
               <a:rPr lang="en-US" dirty="0"/>
               <a:pPr/>
-              <a:t>9/26/2024</a:t>
+              <a:t>9/27/2024</a:t>
             </a:fld>
             <a:endParaRPr lang="en-US" dirty="0"/>
           </a:p>
@@ -1930,7 +2434,7 @@
             <a:fld id="{B61BEF0D-F0BB-DE4B-95CE-6DB70DBA9567}" type="datetimeFigureOut">
               <a:rPr lang="en-US" dirty="0"/>
               <a:pPr/>
-              <a:t>9/26/2024</a:t>
+              <a:t>9/27/2024</a:t>
             </a:fld>
             <a:endParaRPr lang="en-US" dirty="0"/>
           </a:p>
@@ -2247,7 +2751,7 @@
             <a:fld id="{B61BEF0D-F0BB-DE4B-95CE-6DB70DBA9567}" type="datetimeFigureOut">
               <a:rPr lang="en-US" dirty="0"/>
               <a:pPr/>
-              <a:t>9/26/2024</a:t>
+              <a:t>9/27/2024</a:t>
             </a:fld>
             <a:endParaRPr lang="en-US" dirty="0"/>
           </a:p>
@@ -2591,7 +3095,7 @@
             <a:fld id="{B61BEF0D-F0BB-DE4B-95CE-6DB70DBA9567}" type="datetimeFigureOut">
               <a:rPr lang="en-US" dirty="0"/>
               <a:pPr/>
-              <a:t>9/26/2024</a:t>
+              <a:t>9/27/2024</a:t>
             </a:fld>
             <a:endParaRPr lang="en-US" dirty="0"/>
           </a:p>
@@ -2908,7 +3412,7 @@
             <a:fld id="{B61BEF0D-F0BB-DE4B-95CE-6DB70DBA9567}" type="datetimeFigureOut">
               <a:rPr lang="en-US" dirty="0"/>
               <a:pPr/>
-              <a:t>9/26/2024</a:t>
+              <a:t>9/27/2024</a:t>
             </a:fld>
             <a:endParaRPr lang="en-US" dirty="0"/>
           </a:p>
@@ -3304,7 +3808,7 @@
             <a:fld id="{B61BEF0D-F0BB-DE4B-95CE-6DB70DBA9567}" type="datetimeFigureOut">
               <a:rPr lang="en-US" dirty="0"/>
               <a:pPr/>
-              <a:t>9/26/2024</a:t>
+              <a:t>9/27/2024</a:t>
             </a:fld>
             <a:endParaRPr lang="en-US" dirty="0"/>
           </a:p>
@@ -3476,7 +3980,7 @@
           <a:p>
             <a:fld id="{55C6B4A9-1611-4792-9094-5F34BCA07E0B}" type="datetimeFigureOut">
               <a:rPr lang="en-US" dirty="0"/>
-              <a:t>9/26/2024</a:t>
+              <a:t>9/27/2024</a:t>
             </a:fld>
             <a:endParaRPr lang="en-US" dirty="0"/>
           </a:p>
@@ -3659,7 +4163,7 @@
             <a:fld id="{B61BEF0D-F0BB-DE4B-95CE-6DB70DBA9567}" type="datetimeFigureOut">
               <a:rPr lang="en-US" dirty="0"/>
               <a:pPr/>
-              <a:t>9/26/2024</a:t>
+              <a:t>9/27/2024</a:t>
             </a:fld>
             <a:endParaRPr lang="en-US" dirty="0"/>
           </a:p>
@@ -6338,7 +6842,7 @@
             <a:fld id="{B61BEF0D-F0BB-DE4B-95CE-6DB70DBA9567}" type="datetimeFigureOut">
               <a:rPr lang="en-US" dirty="0"/>
               <a:pPr/>
-              <a:t>9/26/2024</a:t>
+              <a:t>9/27/2024</a:t>
             </a:fld>
             <a:endParaRPr lang="en-US" dirty="0"/>
           </a:p>
@@ -12079,7 +12583,7 @@
             <a:fld id="{B61BEF0D-F0BB-DE4B-95CE-6DB70DBA9567}" type="datetimeFigureOut">
               <a:rPr lang="en-US" dirty="0"/>
               <a:pPr/>
-              <a:t>9/26/2024</a:t>
+              <a:t>9/27/2024</a:t>
             </a:fld>
             <a:endParaRPr lang="en-US" dirty="0"/>
           </a:p>
@@ -12313,7 +12817,7 @@
           <a:p>
             <a:fld id="{EB712588-04B1-427B-82EE-E8DB90309F08}" type="datetimeFigureOut">
               <a:rPr lang="en-US" dirty="0"/>
-              <a:t>9/26/2024</a:t>
+              <a:t>9/27/2024</a:t>
             </a:fld>
             <a:endParaRPr lang="en-US" dirty="0"/>
           </a:p>
@@ -12690,7 +13194,7 @@
             <a:fld id="{B61BEF0D-F0BB-DE4B-95CE-6DB70DBA9567}" type="datetimeFigureOut">
               <a:rPr lang="en-US" dirty="0"/>
               <a:pPr/>
-              <a:t>9/26/2024</a:t>
+              <a:t>9/27/2024</a:t>
             </a:fld>
             <a:endParaRPr lang="en-US" dirty="0"/>
           </a:p>
@@ -12816,7 +13320,7 @@
             <a:fld id="{B61BEF0D-F0BB-DE4B-95CE-6DB70DBA9567}" type="datetimeFigureOut">
               <a:rPr lang="en-US" dirty="0"/>
               <a:pPr/>
-              <a:t>9/26/2024</a:t>
+              <a:t>9/27/2024</a:t>
             </a:fld>
             <a:endParaRPr lang="en-US" dirty="0"/>
           </a:p>
@@ -14841,7 +15345,7 @@
             <a:fld id="{B61BEF0D-F0BB-DE4B-95CE-6DB70DBA9567}" type="datetimeFigureOut">
               <a:rPr lang="en-US" dirty="0"/>
               <a:pPr/>
-              <a:t>9/26/2024</a:t>
+              <a:t>9/27/2024</a:t>
             </a:fld>
             <a:endParaRPr lang="en-US" dirty="0"/>
           </a:p>
@@ -17025,7 +17529,7 @@
           <a:p>
             <a:fld id="{42A54C80-263E-416B-A8E0-580EDEADCBDC}" type="datetimeFigureOut">
               <a:rPr lang="en-US" dirty="0"/>
-              <a:t>9/26/2024</a:t>
+              <a:t>9/27/2024</a:t>
             </a:fld>
             <a:endParaRPr lang="en-US" dirty="0"/>
           </a:p>
@@ -18254,7 +18758,7 @@
             <a:fld id="{B61BEF0D-F0BB-DE4B-95CE-6DB70DBA9567}" type="datetimeFigureOut">
               <a:rPr lang="en-US" dirty="0"/>
               <a:pPr/>
-              <a:t>9/26/2024</a:t>
+              <a:t>9/27/2024</a:t>
             </a:fld>
             <a:endParaRPr lang="en-US" dirty="0"/>
           </a:p>
@@ -19963,7 +20467,7 @@
             <a:fld id="{B61BEF0D-F0BB-DE4B-95CE-6DB70DBA9567}" type="datetimeFigureOut">
               <a:rPr lang="en-US" dirty="0"/>
               <a:pPr/>
-              <a:t>9/26/2024</a:t>
+              <a:t>9/27/2024</a:t>
             </a:fld>
             <a:endParaRPr lang="en-US" dirty="0"/>
           </a:p>
@@ -20528,7 +21032,7 @@
           <a:p>
             <a:r>
               <a:rPr lang="en-US" dirty="0"/>
-              <a:t>Cloud Concepts and AZURE basics</a:t>
+              <a:t>Azure Networking</a:t>
             </a:r>
           </a:p>
         </p:txBody>
@@ -20537,6 +21041,203 @@
     <p:extLst>
       <p:ext uri="{BB962C8B-B14F-4D97-AF65-F5344CB8AC3E}">
         <p14:creationId xmlns:p14="http://schemas.microsoft.com/office/powerpoint/2010/main" val="2202437675"/>
+      </p:ext>
+    </p:extLst>
+  </p:cSld>
+  <p:clrMapOvr>
+    <a:masterClrMapping/>
+  </p:clrMapOvr>
+</p:sld>
+</file>
+
+<file path=ppt/slides/slide10.xml><?xml version="1.0" encoding="utf-8"?>
+<p:sld xmlns:a="http://schemas.openxmlformats.org/drawingml/2006/main" xmlns:r="http://schemas.openxmlformats.org/officeDocument/2006/relationships" xmlns:p="http://schemas.openxmlformats.org/presentationml/2006/main">
+  <p:cSld>
+    <p:spTree>
+      <p:nvGrpSpPr>
+        <p:cNvPr id="1" name=""/>
+        <p:cNvGrpSpPr/>
+        <p:nvPr/>
+      </p:nvGrpSpPr>
+      <p:grpSpPr>
+        <a:xfrm>
+          <a:off x="0" y="0"/>
+          <a:ext cx="0" cy="0"/>
+          <a:chOff x="0" y="0"/>
+          <a:chExt cx="0" cy="0"/>
+        </a:xfrm>
+      </p:grpSpPr>
+      <p:sp>
+        <p:nvSpPr>
+          <p:cNvPr id="3" name="Title 2">
+            <a:extLst>
+              <a:ext uri="{FF2B5EF4-FFF2-40B4-BE49-F238E27FC236}">
+                <a16:creationId xmlns:a16="http://schemas.microsoft.com/office/drawing/2014/main" id="{38D62608-F5E4-7EC0-5EF0-4F988DDDEC5B}"/>
+              </a:ext>
+            </a:extLst>
+          </p:cNvPr>
+          <p:cNvSpPr>
+            <a:spLocks noGrp="1"/>
+          </p:cNvSpPr>
+          <p:nvPr>
+            <p:ph type="title"/>
+          </p:nvPr>
+        </p:nvSpPr>
+        <p:spPr>
+          <a:xfrm>
+            <a:off x="1255597" y="1548584"/>
+            <a:ext cx="9875463" cy="604685"/>
+          </a:xfrm>
+        </p:spPr>
+        <p:txBody>
+          <a:bodyPr/>
+          <a:lstStyle/>
+          <a:p>
+            <a:r>
+              <a:rPr lang="en-US" dirty="0"/>
+              <a:t>Lab</a:t>
+            </a:r>
+          </a:p>
+        </p:txBody>
+      </p:sp>
+      <p:sp>
+        <p:nvSpPr>
+          <p:cNvPr id="2" name="Slide Number Placeholder 1">
+            <a:extLst>
+              <a:ext uri="{FF2B5EF4-FFF2-40B4-BE49-F238E27FC236}">
+                <a16:creationId xmlns:a16="http://schemas.microsoft.com/office/drawing/2014/main" id="{1DCFAD14-1AAA-8CDA-A49B-523FD6C66F35}"/>
+              </a:ext>
+            </a:extLst>
+          </p:cNvPr>
+          <p:cNvSpPr>
+            <a:spLocks noGrp="1"/>
+          </p:cNvSpPr>
+          <p:nvPr>
+            <p:ph type="sldNum" sz="quarter" idx="10"/>
+          </p:nvPr>
+        </p:nvSpPr>
+        <p:spPr/>
+        <p:txBody>
+          <a:bodyPr/>
+          <a:lstStyle/>
+          <a:p>
+            <a:fld id="{48F63A3B-78C7-47BE-AE5E-E10140E04643}" type="slidenum">
+              <a:rPr lang="en-US" smtClean="0"/>
+              <a:pPr/>
+              <a:t>10</a:t>
+            </a:fld>
+            <a:endParaRPr lang="en-US" dirty="0"/>
+          </a:p>
+        </p:txBody>
+      </p:sp>
+    </p:spTree>
+    <p:extLst>
+      <p:ext uri="{BB962C8B-B14F-4D97-AF65-F5344CB8AC3E}">
+        <p14:creationId xmlns:p14="http://schemas.microsoft.com/office/powerpoint/2010/main" val="1813142504"/>
+      </p:ext>
+    </p:extLst>
+  </p:cSld>
+  <p:clrMapOvr>
+    <a:masterClrMapping/>
+  </p:clrMapOvr>
+</p:sld>
+</file>
+
+<file path=ppt/slides/slide11.xml><?xml version="1.0" encoding="utf-8"?>
+<p:sld xmlns:a="http://schemas.openxmlformats.org/drawingml/2006/main" xmlns:r="http://schemas.openxmlformats.org/officeDocument/2006/relationships" xmlns:p="http://schemas.openxmlformats.org/presentationml/2006/main">
+  <p:cSld>
+    <p:spTree>
+      <p:nvGrpSpPr>
+        <p:cNvPr id="1" name=""/>
+        <p:cNvGrpSpPr/>
+        <p:nvPr/>
+      </p:nvGrpSpPr>
+      <p:grpSpPr>
+        <a:xfrm>
+          <a:off x="0" y="0"/>
+          <a:ext cx="0" cy="0"/>
+          <a:chOff x="0" y="0"/>
+          <a:chExt cx="0" cy="0"/>
+        </a:xfrm>
+      </p:grpSpPr>
+      <p:sp>
+        <p:nvSpPr>
+          <p:cNvPr id="2" name="Title 1">
+            <a:extLst>
+              <a:ext uri="{FF2B5EF4-FFF2-40B4-BE49-F238E27FC236}">
+                <a16:creationId xmlns:a16="http://schemas.microsoft.com/office/drawing/2014/main" id="{509D22C5-0C9E-B582-A8FE-B45E70A01E7F}"/>
+              </a:ext>
+            </a:extLst>
+          </p:cNvPr>
+          <p:cNvSpPr>
+            <a:spLocks noGrp="1"/>
+          </p:cNvSpPr>
+          <p:nvPr>
+            <p:ph type="ctrTitle"/>
+          </p:nvPr>
+        </p:nvSpPr>
+        <p:spPr/>
+        <p:txBody>
+          <a:bodyPr/>
+          <a:lstStyle/>
+          <a:p>
+            <a:r>
+              <a:rPr lang="en-US" dirty="0"/>
+              <a:t>Thank you</a:t>
+            </a:r>
+          </a:p>
+        </p:txBody>
+      </p:sp>
+      <p:sp>
+        <p:nvSpPr>
+          <p:cNvPr id="3" name="Subtitle 2">
+            <a:extLst>
+              <a:ext uri="{FF2B5EF4-FFF2-40B4-BE49-F238E27FC236}">
+                <a16:creationId xmlns:a16="http://schemas.microsoft.com/office/drawing/2014/main" id="{D8B5CEF2-E667-BBB5-2EA6-C06F93B6DE12}"/>
+              </a:ext>
+            </a:extLst>
+          </p:cNvPr>
+          <p:cNvSpPr>
+            <a:spLocks noGrp="1"/>
+          </p:cNvSpPr>
+          <p:nvPr>
+            <p:ph type="subTitle" idx="1"/>
+          </p:nvPr>
+        </p:nvSpPr>
+        <p:spPr/>
+        <p:txBody>
+          <a:bodyPr/>
+          <a:lstStyle/>
+          <a:p>
+            <a:r>
+              <a:rPr lang="en-US" dirty="0"/>
+              <a:t>Radhey Mishra</a:t>
+            </a:r>
+          </a:p>
+          <a:p>
+            <a:r>
+              <a:rPr lang="en-US" dirty="0"/>
+              <a:t>+91-96500-65900</a:t>
+            </a:r>
+          </a:p>
+          <a:p>
+            <a:r>
+              <a:rPr lang="en-US" dirty="0"/>
+              <a:t>stepuplogics@gmail.com </a:t>
+            </a:r>
+          </a:p>
+          <a:p>
+            <a:r>
+              <a:rPr lang="en-US" dirty="0"/>
+              <a:t>www.stepuplogics.com</a:t>
+            </a:r>
+          </a:p>
+        </p:txBody>
+      </p:sp>
+    </p:spTree>
+    <p:extLst>
+      <p:ext uri="{BB962C8B-B14F-4D97-AF65-F5344CB8AC3E}">
+        <p14:creationId xmlns:p14="http://schemas.microsoft.com/office/powerpoint/2010/main" val="1973173046"/>
       </p:ext>
     </p:extLst>
   </p:cSld>
@@ -20620,23 +21321,9 @@
         </p:spPr>
         <p:txBody>
           <a:bodyPr>
-            <a:normAutofit fontScale="92500" lnSpcReduction="20000"/>
+            <a:normAutofit/>
           </a:bodyPr>
           <a:lstStyle/>
-          <a:p>
-            <a:pPr marL="342900" indent="-342900">
-              <a:buFont typeface="Arial" panose="020B0604020202020204" pitchFamily="34" charset="0"/>
-              <a:buChar char="•"/>
-            </a:pPr>
-            <a:r>
-              <a:rPr lang="en-US" sz="1800" dirty="0"/>
-              <a:t>Introduction of cloud and </a:t>
-            </a:r>
-            <a:r>
-              <a:rPr lang="en-IN" sz="1800" dirty="0"/>
-              <a:t>computing models</a:t>
-            </a:r>
-          </a:p>
           <a:p>
             <a:pPr marL="342900" indent="-342900">
               <a:buFont typeface="Arial" panose="020B0604020202020204" pitchFamily="34" charset="0"/>
@@ -20644,7 +21331,29 @@
             </a:pPr>
             <a:r>
               <a:rPr lang="en-IN" sz="1800" dirty="0"/>
-              <a:t>Cloud market share</a:t>
+              <a:t>Azure Virtual Network (</a:t>
+            </a:r>
+            <a:r>
+              <a:rPr lang="en-IN" sz="1800" dirty="0" err="1"/>
+              <a:t>VNet</a:t>
+            </a:r>
+            <a:r>
+              <a:rPr lang="en-IN" sz="1800" dirty="0"/>
+              <a:t>) </a:t>
+            </a:r>
+          </a:p>
+          <a:p>
+            <a:pPr marL="342900" indent="-342900">
+              <a:buFont typeface="Arial" panose="020B0604020202020204" pitchFamily="34" charset="0"/>
+              <a:buChar char="•"/>
+            </a:pPr>
+            <a:r>
+              <a:rPr lang="en-IN" sz="1800" dirty="0" err="1"/>
+              <a:t>VNet</a:t>
+            </a:r>
+            <a:r>
+              <a:rPr lang="en-IN" sz="1800" dirty="0"/>
+              <a:t> Components (Address Space (IP), Subnets, Network Interface Card (NIC), Azure Load Balancer, Application Gateway, Traffic Manager, Network Security Groups (NSGs), Virtual Network Peering, Virtual Network Gateways)</a:t>
             </a:r>
           </a:p>
           <a:p>
@@ -20654,7 +21363,7 @@
             </a:pPr>
             <a:r>
               <a:rPr lang="en-IN" sz="1800" dirty="0"/>
-              <a:t>Cloud Service Models and Cloud Deployment model</a:t>
+              <a:t>DDOs Protection</a:t>
             </a:r>
           </a:p>
           <a:p>
@@ -20663,8 +21372,12 @@
               <a:buChar char="•"/>
             </a:pPr>
             <a:r>
-              <a:rPr lang="en-US" sz="1800" dirty="0"/>
-              <a:t>Top Security Concerns in cloud Computing</a:t>
+              <a:rPr lang="en-IN" sz="1800" dirty="0" err="1"/>
+              <a:t>VNet</a:t>
+            </a:r>
+            <a:r>
+              <a:rPr lang="en-IN" sz="1800" dirty="0"/>
+              <a:t> Connectivity</a:t>
             </a:r>
           </a:p>
           <a:p>
@@ -20673,8 +21386,8 @@
               <a:buChar char="•"/>
             </a:pPr>
             <a:r>
-              <a:rPr lang="en-US" sz="1800" dirty="0"/>
-              <a:t>Cloud Design Pattern</a:t>
+              <a:rPr lang="en-IN" sz="1800" dirty="0"/>
+              <a:t>VPN</a:t>
             </a:r>
           </a:p>
           <a:p>
@@ -20682,66 +21395,7 @@
               <a:buFont typeface="Arial" panose="020B0604020202020204" pitchFamily="34" charset="0"/>
               <a:buChar char="•"/>
             </a:pPr>
-            <a:r>
-              <a:rPr lang="en-US" sz="1800" dirty="0"/>
-              <a:t>Important Terms (Cloud Agnostics, Cloud Native, Virtualization, Virtual Machine, API, Scalability, Elasticity, Agility, High Availability, Fault tolerance, Disaster recovery, VPN , Load balancing, Serverless)</a:t>
-            </a:r>
-          </a:p>
-          <a:p>
-            <a:pPr marL="342900" indent="-342900">
-              <a:buFont typeface="Arial" panose="020B0604020202020204" pitchFamily="34" charset="0"/>
-              <a:buChar char="•"/>
-            </a:pPr>
-            <a:r>
-              <a:rPr lang="en-US" sz="1800" dirty="0"/>
-              <a:t>Introduction to Azure, Benefits, Azure IAAS PAAS SAAS,</a:t>
-            </a:r>
-          </a:p>
-          <a:p>
-            <a:pPr marL="342900" indent="-342900">
-              <a:buFont typeface="Arial" panose="020B0604020202020204" pitchFamily="34" charset="0"/>
-              <a:buChar char="•"/>
-            </a:pPr>
-            <a:r>
-              <a:rPr lang="en-US" sz="1800" dirty="0"/>
-              <a:t>Create an Account</a:t>
-            </a:r>
-          </a:p>
-          <a:p>
-            <a:pPr marL="342900" indent="-342900">
-              <a:buFont typeface="Arial" panose="020B0604020202020204" pitchFamily="34" charset="0"/>
-              <a:buChar char="•"/>
-            </a:pPr>
-            <a:r>
-              <a:rPr lang="en-US" sz="1800" dirty="0"/>
-              <a:t>Azure Account, Subscription, and Resource Group Hierarchy Explained</a:t>
-            </a:r>
-          </a:p>
-          <a:p>
-            <a:pPr marL="342900" indent="-342900">
-              <a:lnSpc>
-                <a:spcPct val="160000"/>
-              </a:lnSpc>
-              <a:buFont typeface="Arial" panose="020B0604020202020204" pitchFamily="34" charset="0"/>
-              <a:buChar char="•"/>
-            </a:pPr>
-            <a:r>
-              <a:rPr lang="en-IN" sz="1800" dirty="0"/>
-              <a:t>Components of Azure Architecture (Date Centre, Region, Availability Zone, Resource, Services)</a:t>
-            </a:r>
-          </a:p>
-          <a:p>
-            <a:pPr marL="342900" indent="-342900">
-              <a:lnSpc>
-                <a:spcPct val="160000"/>
-              </a:lnSpc>
-              <a:buFont typeface="Arial" panose="020B0604020202020204" pitchFamily="34" charset="0"/>
-              <a:buChar char="•"/>
-            </a:pPr>
-            <a:r>
-              <a:rPr lang="en-IN" sz="1800" dirty="0"/>
-              <a:t>Connect with Azure portal</a:t>
-            </a:r>
+            <a:endParaRPr lang="en-IN" sz="1800" dirty="0"/>
           </a:p>
           <a:p>
             <a:pPr marL="342900" indent="-342900">
@@ -20857,7 +21511,15 @@
           <a:p>
             <a:r>
               <a:rPr lang="en-US" dirty="0"/>
-              <a:t>AZURE Kubernetes Service</a:t>
+              <a:t>Azure Virtual Network (</a:t>
+            </a:r>
+            <a:r>
+              <a:rPr lang="en-US" dirty="0" err="1"/>
+              <a:t>VNet</a:t>
+            </a:r>
+            <a:r>
+              <a:rPr lang="en-US" dirty="0"/>
+              <a:t>)</a:t>
             </a:r>
           </a:p>
         </p:txBody>
@@ -20886,153 +21548,109 @@
         </p:spPr>
         <p:txBody>
           <a:bodyPr>
-            <a:normAutofit/>
+            <a:normAutofit fontScale="85000" lnSpcReduction="10000"/>
           </a:bodyPr>
           <a:lstStyle/>
           <a:p>
             <a:r>
-              <a:rPr lang="en-US" dirty="0">
-                <a:solidFill>
-                  <a:srgbClr val="0070C0"/>
-                </a:solidFill>
-              </a:rPr>
-              <a:t>AKS</a:t>
+              <a:rPr lang="en-US" sz="1900" dirty="0"/>
+              <a:t>Azure Virtual Network (</a:t>
             </a:r>
             <a:r>
-              <a:rPr lang="en-US" dirty="0"/>
-              <a:t> – Azure Kubernetes Service </a:t>
-            </a:r>
-          </a:p>
-          <a:p>
-            <a:r>
-              <a:rPr lang="en-US" dirty="0"/>
-              <a:t>AKS is </a:t>
+              <a:rPr lang="en-US" sz="1900" dirty="0" err="1"/>
+              <a:t>VNet</a:t>
             </a:r>
             <a:r>
-              <a:rPr lang="en-US" dirty="0">
-                <a:solidFill>
-                  <a:srgbClr val="0070C0"/>
-                </a:solidFill>
-              </a:rPr>
-              <a:t>highly available, secure and fully managed </a:t>
+              <a:rPr lang="en-US" sz="1900" dirty="0"/>
+              <a:t>) is a representation of your network in the cloud. It provides logical isolation of the Azure cloud dedicated to your subscription.</a:t>
+            </a:r>
+          </a:p>
+          <a:p>
+            <a:r>
+              <a:rPr lang="en-US" sz="1900" dirty="0" err="1"/>
+              <a:t>VNets</a:t>
             </a:r>
             <a:r>
-              <a:rPr lang="en-US" dirty="0"/>
-              <a:t>Kubernetes Service</a:t>
+              <a:rPr lang="en-US" sz="1900" dirty="0"/>
+              <a:t> enable Azure resources, such as Virtual Machines (VMs), to securely communicate with each other, the internet, and on-premises networks. </a:t>
             </a:r>
           </a:p>
           <a:p>
             <a:r>
-              <a:rPr lang="en-US" dirty="0"/>
-              <a:t>As on today available in </a:t>
+              <a:rPr lang="en-US" sz="1900" dirty="0"/>
+              <a:t>A </a:t>
             </a:r>
             <a:r>
-              <a:rPr lang="en-US" dirty="0">
-                <a:solidFill>
-                  <a:srgbClr val="0070C0"/>
-                </a:solidFill>
-              </a:rPr>
-              <a:t>36 regions </a:t>
+              <a:rPr lang="en-US" sz="1900" dirty="0" err="1"/>
+              <a:t>VNet</a:t>
             </a:r>
             <a:r>
-              <a:rPr lang="en-US" dirty="0"/>
-              <a:t>and growing. </a:t>
-            </a:r>
-          </a:p>
-          <a:p>
-            <a:r>
-              <a:rPr lang="en-US" dirty="0"/>
-              <a:t>When </a:t>
+              <a:rPr lang="en-US" sz="1900" dirty="0"/>
+              <a:t> is similar to a traditional network in your data </a:t>
             </a:r>
             <a:r>
-              <a:rPr lang="en-US" dirty="0">
-                <a:solidFill>
-                  <a:srgbClr val="0070C0"/>
-                </a:solidFill>
-              </a:rPr>
-              <a:t>compared</a:t>
+              <a:rPr lang="en-US" sz="1900" dirty="0" err="1"/>
+              <a:t>centre</a:t>
             </a:r>
             <a:r>
-              <a:rPr lang="en-US" dirty="0"/>
-              <a:t> to other cloud providers, AKS is the one which is available in highest number of regions</a:t>
+              <a:rPr lang="en-US" sz="1900" dirty="0"/>
+              <a:t> but offers additional benefits of Azure infrastructure such as scalability, availability, and isolation.</a:t>
             </a:r>
           </a:p>
           <a:p>
             <a:r>
-              <a:rPr lang="en-US" dirty="0"/>
-              <a:t>Will be able to run </a:t>
+              <a:rPr lang="en-US" sz="1900" dirty="0" err="1"/>
+              <a:t>VNets</a:t>
             </a:r>
             <a:r>
-              <a:rPr lang="en-US" dirty="0">
-                <a:solidFill>
-                  <a:srgbClr val="0070C0"/>
-                </a:solidFill>
-              </a:rPr>
-              <a:t>any type </a:t>
+              <a:rPr lang="en-US" sz="1900" dirty="0"/>
+              <a:t> are created at the subscription level, within a specific resource group and region. The default limit for the number of </a:t>
             </a:r>
             <a:r>
-              <a:rPr lang="en-US" dirty="0"/>
-              <a:t>of workloads </a:t>
-            </a:r>
-          </a:p>
-          <a:p>
-            <a:pPr lvl="1"/>
-            <a:r>
-              <a:rPr lang="en-US" dirty="0">
-                <a:solidFill>
-                  <a:srgbClr val="0070C0"/>
-                </a:solidFill>
-              </a:rPr>
-              <a:t>Windows</a:t>
+              <a:rPr lang="en-US" sz="1900" dirty="0" err="1"/>
+              <a:t>VNets</a:t>
             </a:r>
             <a:r>
-              <a:rPr lang="en-US" dirty="0"/>
-              <a:t> based applications like .NET Apps </a:t>
+              <a:rPr lang="en-US" sz="1900" dirty="0"/>
+              <a:t> you can create in a single Azure subscription is 1,000.</a:t>
             </a:r>
           </a:p>
           <a:p>
-            <a:pPr lvl="1"/>
             <a:r>
-              <a:rPr lang="en-US" dirty="0">
-                <a:solidFill>
-                  <a:srgbClr val="0070C0"/>
-                </a:solidFill>
-              </a:rPr>
-              <a:t>Linux</a:t>
+              <a:rPr lang="en-US" sz="1900" dirty="0"/>
+              <a:t>When you create multiple resources (e.g., VMs) within a single </a:t>
             </a:r>
             <a:r>
-              <a:rPr lang="en-US" dirty="0"/>
-              <a:t> supported applications like Java</a:t>
-            </a:r>
-          </a:p>
-          <a:p>
-            <a:pPr lvl="1"/>
-            <a:r>
-              <a:rPr lang="en-US" dirty="0">
-                <a:solidFill>
-                  <a:srgbClr val="0070C0"/>
-                </a:solidFill>
-              </a:rPr>
-              <a:t>IOT device deployment </a:t>
+              <a:rPr lang="en-US" sz="1900" dirty="0" err="1"/>
+              <a:t>VNet</a:t>
             </a:r>
             <a:r>
-              <a:rPr lang="en-US" dirty="0"/>
-              <a:t>and management on demand</a:t>
-            </a:r>
-          </a:p>
-          <a:p>
-            <a:pPr lvl="1"/>
-            <a:r>
-              <a:rPr lang="en-US" dirty="0">
-                <a:solidFill>
-                  <a:srgbClr val="0070C0"/>
-                </a:solidFill>
-              </a:rPr>
-              <a:t>Machine Learning </a:t>
+              <a:rPr lang="en-US" sz="1900" dirty="0"/>
+              <a:t>, they can communicate with each other using private IP addresses without needing internet access or </a:t>
             </a:r>
             <a:r>
-              <a:rPr lang="en-US" dirty="0"/>
-              <a:t>Model training with AKS</a:t>
+              <a:rPr lang="en-US" sz="1900" dirty="0" err="1"/>
+              <a:t>VNet</a:t>
+            </a:r>
+            <a:r>
+              <a:rPr lang="en-US" sz="1900" dirty="0"/>
+              <a:t> peering. If you create resources in different </a:t>
+            </a:r>
+            <a:r>
+              <a:rPr lang="en-US" sz="1900" dirty="0" err="1"/>
+              <a:t>VNets</a:t>
+            </a:r>
+            <a:r>
+              <a:rPr lang="en-US" sz="1900" dirty="0"/>
+              <a:t>, they can communicate using private IPs after establishing </a:t>
+            </a:r>
+            <a:r>
+              <a:rPr lang="en-US" sz="1900" dirty="0" err="1"/>
+              <a:t>VNet</a:t>
+            </a:r>
+            <a:r>
+              <a:rPr lang="en-US" sz="1900" dirty="0"/>
+              <a:t> peering.</a:t>
             </a:r>
           </a:p>
           <a:p>
@@ -21102,10 +21720,10 @@
       </p:grpSpPr>
       <p:sp>
         <p:nvSpPr>
-          <p:cNvPr id="3" name="Title 2">
+          <p:cNvPr id="2" name="Title 1">
             <a:extLst>
               <a:ext uri="{FF2B5EF4-FFF2-40B4-BE49-F238E27FC236}">
-                <a16:creationId xmlns:a16="http://schemas.microsoft.com/office/drawing/2014/main" id="{38D62608-F5E4-7EC0-5EF0-4F988DDDEC5B}"/>
+                <a16:creationId xmlns:a16="http://schemas.microsoft.com/office/drawing/2014/main" id="{FD5E8954-9BCB-7FD9-A210-38DC54382D45}"/>
               </a:ext>
             </a:extLst>
           </p:cNvPr>
@@ -21118,8 +21736,8 @@
         </p:nvSpPr>
         <p:spPr>
           <a:xfrm>
-            <a:off x="1255597" y="1548584"/>
-            <a:ext cx="9875463" cy="604685"/>
+            <a:off x="3460566" y="741680"/>
+            <a:ext cx="8071034" cy="731520"/>
           </a:xfrm>
         </p:spPr>
         <p:txBody>
@@ -21128,17 +21746,121 @@
           <a:p>
             <a:r>
               <a:rPr lang="en-US" dirty="0"/>
-              <a:t>Demo – Create a cluster</a:t>
+              <a:t>Azure Virtual Network (</a:t>
+            </a:r>
+            <a:r>
+              <a:rPr lang="en-US" dirty="0" err="1"/>
+              <a:t>VNet</a:t>
+            </a:r>
+            <a:r>
+              <a:rPr lang="en-US" dirty="0"/>
+              <a:t>) Connectivity</a:t>
             </a:r>
           </a:p>
         </p:txBody>
       </p:sp>
       <p:sp>
         <p:nvSpPr>
-          <p:cNvPr id="2" name="Slide Number Placeholder 1">
+          <p:cNvPr id="3" name="Content Placeholder 2">
             <a:extLst>
               <a:ext uri="{FF2B5EF4-FFF2-40B4-BE49-F238E27FC236}">
-                <a16:creationId xmlns:a16="http://schemas.microsoft.com/office/drawing/2014/main" id="{1DCFAD14-1AAA-8CDA-A49B-523FD6C66F35}"/>
+                <a16:creationId xmlns:a16="http://schemas.microsoft.com/office/drawing/2014/main" id="{75111C33-898C-4414-4665-5136EB6FC126}"/>
+              </a:ext>
+            </a:extLst>
+          </p:cNvPr>
+          <p:cNvSpPr>
+            <a:spLocks noGrp="1"/>
+          </p:cNvSpPr>
+          <p:nvPr>
+            <p:ph sz="half" idx="2"/>
+          </p:nvPr>
+        </p:nvSpPr>
+        <p:spPr>
+          <a:xfrm>
+            <a:off x="3460564" y="1757681"/>
+            <a:ext cx="8071035" cy="4043046"/>
+          </a:xfrm>
+        </p:spPr>
+        <p:txBody>
+          <a:bodyPr>
+            <a:normAutofit/>
+          </a:bodyPr>
+          <a:lstStyle/>
+          <a:p>
+            <a:r>
+              <a:rPr lang="en-US" dirty="0"/>
+              <a:t>Azure Virtual Network (</a:t>
+            </a:r>
+            <a:r>
+              <a:rPr lang="en-US" dirty="0" err="1"/>
+              <a:t>VNet</a:t>
+            </a:r>
+            <a:r>
+              <a:rPr lang="en-US" dirty="0"/>
+              <a:t>) connectivity allows you to connect and integrate different </a:t>
+            </a:r>
+            <a:r>
+              <a:rPr lang="en-US" dirty="0" err="1"/>
+              <a:t>VNets</a:t>
+            </a:r>
+            <a:r>
+              <a:rPr lang="en-US" dirty="0"/>
+              <a:t> to enable seamless communication between resources in your cloud environment. This can be done within the same region or across different regions globally.</a:t>
+            </a:r>
+          </a:p>
+          <a:p>
+            <a:pPr marL="400050" lvl="1" indent="0">
+              <a:buNone/>
+            </a:pPr>
+            <a:r>
+              <a:rPr lang="en-US" dirty="0"/>
+              <a:t>1) </a:t>
+            </a:r>
+            <a:r>
+              <a:rPr lang="en-US" dirty="0" err="1"/>
+              <a:t>VNet</a:t>
+            </a:r>
+            <a:r>
+              <a:rPr lang="en-US" dirty="0"/>
+              <a:t> to </a:t>
+            </a:r>
+            <a:r>
+              <a:rPr lang="en-US" dirty="0" err="1"/>
+              <a:t>VNet</a:t>
+            </a:r>
+            <a:r>
+              <a:rPr lang="en-US" dirty="0"/>
+              <a:t> Peering</a:t>
+            </a:r>
+          </a:p>
+          <a:p>
+            <a:pPr marL="400050" lvl="1" indent="0">
+              <a:buNone/>
+            </a:pPr>
+            <a:r>
+              <a:rPr lang="en-US" dirty="0"/>
+              <a:t>2) Global </a:t>
+            </a:r>
+            <a:r>
+              <a:rPr lang="en-US" dirty="0" err="1"/>
+              <a:t>VNet</a:t>
+            </a:r>
+            <a:r>
+              <a:rPr lang="en-US" dirty="0"/>
+              <a:t> Peering</a:t>
+            </a:r>
+          </a:p>
+          <a:p>
+            <a:endParaRPr lang="en-US" dirty="0"/>
+          </a:p>
+        </p:txBody>
+      </p:sp>
+      <p:sp>
+        <p:nvSpPr>
+          <p:cNvPr id="23" name="Slide Number Placeholder 22">
+            <a:extLst>
+              <a:ext uri="{FF2B5EF4-FFF2-40B4-BE49-F238E27FC236}">
+                <a16:creationId xmlns:a16="http://schemas.microsoft.com/office/drawing/2014/main" id="{94FF72B7-0438-3641-5939-75128934B0DF}"/>
               </a:ext>
             </a:extLst>
           </p:cNvPr>
@@ -21166,7 +21888,7 @@
     </p:spTree>
     <p:extLst>
       <p:ext uri="{BB962C8B-B14F-4D97-AF65-F5344CB8AC3E}">
-        <p14:creationId xmlns:p14="http://schemas.microsoft.com/office/powerpoint/2010/main" val="1813142504"/>
+        <p14:creationId xmlns:p14="http://schemas.microsoft.com/office/powerpoint/2010/main" val="2753983298"/>
       </p:ext>
     </p:extLst>
   </p:cSld>
@@ -21198,7 +21920,7 @@
           <p:cNvPr id="2" name="Title 1">
             <a:extLst>
               <a:ext uri="{FF2B5EF4-FFF2-40B4-BE49-F238E27FC236}">
-                <a16:creationId xmlns:a16="http://schemas.microsoft.com/office/drawing/2014/main" id="{509D22C5-0C9E-B582-A8FE-B45E70A01E7F}"/>
+                <a16:creationId xmlns:a16="http://schemas.microsoft.com/office/drawing/2014/main" id="{FD5E8954-9BCB-7FD9-A210-38DC54382D45}"/>
               </a:ext>
             </a:extLst>
           </p:cNvPr>
@@ -21206,27 +21928,37 @@
             <a:spLocks noGrp="1"/>
           </p:cNvSpPr>
           <p:nvPr>
-            <p:ph type="ctrTitle"/>
+            <p:ph type="title"/>
           </p:nvPr>
         </p:nvSpPr>
-        <p:spPr/>
+        <p:spPr>
+          <a:xfrm>
+            <a:off x="3460566" y="741680"/>
+            <a:ext cx="8071034" cy="731520"/>
+          </a:xfrm>
+        </p:spPr>
         <p:txBody>
           <a:bodyPr/>
           <a:lstStyle/>
           <a:p>
             <a:r>
               <a:rPr lang="en-US" dirty="0"/>
-              <a:t>Thank you</a:t>
+              <a:t>Azure </a:t>
             </a:r>
+            <a:r>
+              <a:rPr lang="en-IN" dirty="0"/>
+              <a:t>Network Interface Card (NIC)</a:t>
+            </a:r>
+            <a:endParaRPr lang="en-US" dirty="0"/>
           </a:p>
         </p:txBody>
       </p:sp>
       <p:sp>
         <p:nvSpPr>
-          <p:cNvPr id="3" name="Subtitle 2">
+          <p:cNvPr id="3" name="Content Placeholder 2">
             <a:extLst>
               <a:ext uri="{FF2B5EF4-FFF2-40B4-BE49-F238E27FC236}">
-                <a16:creationId xmlns:a16="http://schemas.microsoft.com/office/drawing/2014/main" id="{D8B5CEF2-E667-BBB5-2EA6-C06F93B6DE12}"/>
+                <a16:creationId xmlns:a16="http://schemas.microsoft.com/office/drawing/2014/main" id="{75111C33-898C-4414-4665-5136EB6FC126}"/>
               </a:ext>
             </a:extLst>
           </p:cNvPr>
@@ -21234,7 +21966,53 @@
             <a:spLocks noGrp="1"/>
           </p:cNvSpPr>
           <p:nvPr>
-            <p:ph type="subTitle" idx="1"/>
+            <p:ph sz="half" idx="2"/>
+          </p:nvPr>
+        </p:nvSpPr>
+        <p:spPr>
+          <a:xfrm>
+            <a:off x="3460564" y="1757681"/>
+            <a:ext cx="8071035" cy="4043046"/>
+          </a:xfrm>
+        </p:spPr>
+        <p:txBody>
+          <a:bodyPr>
+            <a:normAutofit/>
+          </a:bodyPr>
+          <a:lstStyle/>
+          <a:p>
+            <a:r>
+              <a:rPr lang="en-US" dirty="0"/>
+              <a:t>A Network Interface Card (NIC) is a crucial component in Azure that connects a virtual machine (VM) or other Azure resources to a virtual network (</a:t>
+            </a:r>
+            <a:r>
+              <a:rPr lang="en-US" dirty="0" err="1"/>
+              <a:t>VNet</a:t>
+            </a:r>
+            <a:r>
+              <a:rPr lang="en-US" dirty="0"/>
+              <a:t>). It facilitates communication between the resource and the network, allowing it to send and receive data.</a:t>
+            </a:r>
+          </a:p>
+          <a:p>
+            <a:endParaRPr lang="en-US" dirty="0"/>
+          </a:p>
+        </p:txBody>
+      </p:sp>
+      <p:sp>
+        <p:nvSpPr>
+          <p:cNvPr id="23" name="Slide Number Placeholder 22">
+            <a:extLst>
+              <a:ext uri="{FF2B5EF4-FFF2-40B4-BE49-F238E27FC236}">
+                <a16:creationId xmlns:a16="http://schemas.microsoft.com/office/drawing/2014/main" id="{94FF72B7-0438-3641-5939-75128934B0DF}"/>
+              </a:ext>
+            </a:extLst>
+          </p:cNvPr>
+          <p:cNvSpPr>
+            <a:spLocks noGrp="1"/>
+          </p:cNvSpPr>
+          <p:nvPr>
+            <p:ph type="sldNum" sz="quarter" idx="10"/>
           </p:nvPr>
         </p:nvSpPr>
         <p:spPr/>
@@ -21242,35 +22020,540 @@
           <a:bodyPr/>
           <a:lstStyle/>
           <a:p>
-            <a:r>
-              <a:rPr lang="en-US" dirty="0"/>
-              <a:t>Radhey Mishra</a:t>
-            </a:r>
-          </a:p>
-          <a:p>
-            <a:r>
-              <a:rPr lang="en-US" dirty="0"/>
-              <a:t>+91-96500-65900</a:t>
-            </a:r>
-          </a:p>
-          <a:p>
-            <a:r>
-              <a:rPr lang="en-US" dirty="0"/>
-              <a:t>stepuplogics@gmail.com </a:t>
-            </a:r>
-          </a:p>
-          <a:p>
-            <a:r>
-              <a:rPr lang="en-US" dirty="0"/>
-              <a:t>www.stepuplogics.com</a:t>
-            </a:r>
+            <a:fld id="{48F63A3B-78C7-47BE-AE5E-E10140E04643}" type="slidenum">
+              <a:rPr lang="en-US" smtClean="0"/>
+              <a:pPr/>
+              <a:t>5</a:t>
+            </a:fld>
+            <a:endParaRPr lang="en-US" dirty="0"/>
           </a:p>
         </p:txBody>
       </p:sp>
     </p:spTree>
     <p:extLst>
       <p:ext uri="{BB962C8B-B14F-4D97-AF65-F5344CB8AC3E}">
-        <p14:creationId xmlns:p14="http://schemas.microsoft.com/office/powerpoint/2010/main" val="1973173046"/>
+        <p14:creationId xmlns:p14="http://schemas.microsoft.com/office/powerpoint/2010/main" val="252845630"/>
+      </p:ext>
+    </p:extLst>
+  </p:cSld>
+  <p:clrMapOvr>
+    <a:masterClrMapping/>
+  </p:clrMapOvr>
+</p:sld>
+</file>
+
+<file path=ppt/slides/slide6.xml><?xml version="1.0" encoding="utf-8"?>
+<p:sld xmlns:a="http://schemas.openxmlformats.org/drawingml/2006/main" xmlns:r="http://schemas.openxmlformats.org/officeDocument/2006/relationships" xmlns:p="http://schemas.openxmlformats.org/presentationml/2006/main">
+  <p:cSld>
+    <p:spTree>
+      <p:nvGrpSpPr>
+        <p:cNvPr id="1" name=""/>
+        <p:cNvGrpSpPr/>
+        <p:nvPr/>
+      </p:nvGrpSpPr>
+      <p:grpSpPr>
+        <a:xfrm>
+          <a:off x="0" y="0"/>
+          <a:ext cx="0" cy="0"/>
+          <a:chOff x="0" y="0"/>
+          <a:chExt cx="0" cy="0"/>
+        </a:xfrm>
+      </p:grpSpPr>
+      <p:sp>
+        <p:nvSpPr>
+          <p:cNvPr id="2" name="Title 1">
+            <a:extLst>
+              <a:ext uri="{FF2B5EF4-FFF2-40B4-BE49-F238E27FC236}">
+                <a16:creationId xmlns:a16="http://schemas.microsoft.com/office/drawing/2014/main" id="{FD5E8954-9BCB-7FD9-A210-38DC54382D45}"/>
+              </a:ext>
+            </a:extLst>
+          </p:cNvPr>
+          <p:cNvSpPr>
+            <a:spLocks noGrp="1"/>
+          </p:cNvSpPr>
+          <p:nvPr>
+            <p:ph type="title"/>
+          </p:nvPr>
+        </p:nvSpPr>
+        <p:spPr>
+          <a:xfrm>
+            <a:off x="3460566" y="741680"/>
+            <a:ext cx="8071034" cy="731520"/>
+          </a:xfrm>
+        </p:spPr>
+        <p:txBody>
+          <a:bodyPr/>
+          <a:lstStyle/>
+          <a:p>
+            <a:r>
+              <a:rPr lang="en-US" dirty="0"/>
+              <a:t>Azure Load Balancer</a:t>
+            </a:r>
+          </a:p>
+        </p:txBody>
+      </p:sp>
+      <p:sp>
+        <p:nvSpPr>
+          <p:cNvPr id="3" name="Content Placeholder 2">
+            <a:extLst>
+              <a:ext uri="{FF2B5EF4-FFF2-40B4-BE49-F238E27FC236}">
+                <a16:creationId xmlns:a16="http://schemas.microsoft.com/office/drawing/2014/main" id="{75111C33-898C-4414-4665-5136EB6FC126}"/>
+              </a:ext>
+            </a:extLst>
+          </p:cNvPr>
+          <p:cNvSpPr>
+            <a:spLocks noGrp="1"/>
+          </p:cNvSpPr>
+          <p:nvPr>
+            <p:ph sz="half" idx="2"/>
+          </p:nvPr>
+        </p:nvSpPr>
+        <p:spPr>
+          <a:xfrm>
+            <a:off x="3460564" y="1757681"/>
+            <a:ext cx="8071035" cy="4043046"/>
+          </a:xfrm>
+        </p:spPr>
+        <p:txBody>
+          <a:bodyPr>
+            <a:normAutofit/>
+          </a:bodyPr>
+          <a:lstStyle/>
+          <a:p>
+            <a:r>
+              <a:rPr lang="en-US" dirty="0"/>
+              <a:t>Azure Load Balancer is a fully managed load-balancing service that distributes incoming network traffic across multiple servers, ensuring high availability and reliability of your applications. It operates at Layer 4 (TCP, UDP) of the OSI model, providing both internal and public load balancing solutions.</a:t>
+            </a:r>
+          </a:p>
+        </p:txBody>
+      </p:sp>
+      <p:sp>
+        <p:nvSpPr>
+          <p:cNvPr id="23" name="Slide Number Placeholder 22">
+            <a:extLst>
+              <a:ext uri="{FF2B5EF4-FFF2-40B4-BE49-F238E27FC236}">
+                <a16:creationId xmlns:a16="http://schemas.microsoft.com/office/drawing/2014/main" id="{94FF72B7-0438-3641-5939-75128934B0DF}"/>
+              </a:ext>
+            </a:extLst>
+          </p:cNvPr>
+          <p:cNvSpPr>
+            <a:spLocks noGrp="1"/>
+          </p:cNvSpPr>
+          <p:nvPr>
+            <p:ph type="sldNum" sz="quarter" idx="10"/>
+          </p:nvPr>
+        </p:nvSpPr>
+        <p:spPr/>
+        <p:txBody>
+          <a:bodyPr/>
+          <a:lstStyle/>
+          <a:p>
+            <a:fld id="{48F63A3B-78C7-47BE-AE5E-E10140E04643}" type="slidenum">
+              <a:rPr lang="en-US" smtClean="0"/>
+              <a:pPr/>
+              <a:t>6</a:t>
+            </a:fld>
+            <a:endParaRPr lang="en-US" dirty="0"/>
+          </a:p>
+        </p:txBody>
+      </p:sp>
+    </p:spTree>
+    <p:extLst>
+      <p:ext uri="{BB962C8B-B14F-4D97-AF65-F5344CB8AC3E}">
+        <p14:creationId xmlns:p14="http://schemas.microsoft.com/office/powerpoint/2010/main" val="181040111"/>
+      </p:ext>
+    </p:extLst>
+  </p:cSld>
+  <p:clrMapOvr>
+    <a:masterClrMapping/>
+  </p:clrMapOvr>
+</p:sld>
+</file>
+
+<file path=ppt/slides/slide7.xml><?xml version="1.0" encoding="utf-8"?>
+<p:sld xmlns:a="http://schemas.openxmlformats.org/drawingml/2006/main" xmlns:r="http://schemas.openxmlformats.org/officeDocument/2006/relationships" xmlns:p="http://schemas.openxmlformats.org/presentationml/2006/main">
+  <p:cSld>
+    <p:spTree>
+      <p:nvGrpSpPr>
+        <p:cNvPr id="1" name=""/>
+        <p:cNvGrpSpPr/>
+        <p:nvPr/>
+      </p:nvGrpSpPr>
+      <p:grpSpPr>
+        <a:xfrm>
+          <a:off x="0" y="0"/>
+          <a:ext cx="0" cy="0"/>
+          <a:chOff x="0" y="0"/>
+          <a:chExt cx="0" cy="0"/>
+        </a:xfrm>
+      </p:grpSpPr>
+      <p:sp>
+        <p:nvSpPr>
+          <p:cNvPr id="2" name="Title 1">
+            <a:extLst>
+              <a:ext uri="{FF2B5EF4-FFF2-40B4-BE49-F238E27FC236}">
+                <a16:creationId xmlns:a16="http://schemas.microsoft.com/office/drawing/2014/main" id="{FD5E8954-9BCB-7FD9-A210-38DC54382D45}"/>
+              </a:ext>
+            </a:extLst>
+          </p:cNvPr>
+          <p:cNvSpPr>
+            <a:spLocks noGrp="1"/>
+          </p:cNvSpPr>
+          <p:nvPr>
+            <p:ph type="title"/>
+          </p:nvPr>
+        </p:nvSpPr>
+        <p:spPr>
+          <a:xfrm>
+            <a:off x="3460566" y="741680"/>
+            <a:ext cx="8071034" cy="731520"/>
+          </a:xfrm>
+        </p:spPr>
+        <p:txBody>
+          <a:bodyPr/>
+          <a:lstStyle/>
+          <a:p>
+            <a:r>
+              <a:rPr lang="en-US" dirty="0"/>
+              <a:t>Azure Traffic Manager</a:t>
+            </a:r>
+          </a:p>
+        </p:txBody>
+      </p:sp>
+      <p:sp>
+        <p:nvSpPr>
+          <p:cNvPr id="3" name="Content Placeholder 2">
+            <a:extLst>
+              <a:ext uri="{FF2B5EF4-FFF2-40B4-BE49-F238E27FC236}">
+                <a16:creationId xmlns:a16="http://schemas.microsoft.com/office/drawing/2014/main" id="{75111C33-898C-4414-4665-5136EB6FC126}"/>
+              </a:ext>
+            </a:extLst>
+          </p:cNvPr>
+          <p:cNvSpPr>
+            <a:spLocks noGrp="1"/>
+          </p:cNvSpPr>
+          <p:nvPr>
+            <p:ph sz="half" idx="2"/>
+          </p:nvPr>
+        </p:nvSpPr>
+        <p:spPr>
+          <a:xfrm>
+            <a:off x="3460564" y="1757681"/>
+            <a:ext cx="8071035" cy="4043046"/>
+          </a:xfrm>
+        </p:spPr>
+        <p:txBody>
+          <a:bodyPr>
+            <a:normAutofit/>
+          </a:bodyPr>
+          <a:lstStyle/>
+          <a:p>
+            <a:r>
+              <a:rPr lang="en-US" dirty="0"/>
+              <a:t>Azure Traffic Manager is a DNS-based global traffic distribution solution that allows you to direct user traffic to different endpoints based on various routing methods. It helps improve the availability and responsiveness of your applications by distributing traffic across multiple endpoints worldwide.</a:t>
+            </a:r>
+          </a:p>
+          <a:p>
+            <a:endParaRPr lang="en-US" dirty="0"/>
+          </a:p>
+        </p:txBody>
+      </p:sp>
+      <p:sp>
+        <p:nvSpPr>
+          <p:cNvPr id="23" name="Slide Number Placeholder 22">
+            <a:extLst>
+              <a:ext uri="{FF2B5EF4-FFF2-40B4-BE49-F238E27FC236}">
+                <a16:creationId xmlns:a16="http://schemas.microsoft.com/office/drawing/2014/main" id="{94FF72B7-0438-3641-5939-75128934B0DF}"/>
+              </a:ext>
+            </a:extLst>
+          </p:cNvPr>
+          <p:cNvSpPr>
+            <a:spLocks noGrp="1"/>
+          </p:cNvSpPr>
+          <p:nvPr>
+            <p:ph type="sldNum" sz="quarter" idx="10"/>
+          </p:nvPr>
+        </p:nvSpPr>
+        <p:spPr/>
+        <p:txBody>
+          <a:bodyPr/>
+          <a:lstStyle/>
+          <a:p>
+            <a:fld id="{48F63A3B-78C7-47BE-AE5E-E10140E04643}" type="slidenum">
+              <a:rPr lang="en-US" smtClean="0"/>
+              <a:pPr/>
+              <a:t>7</a:t>
+            </a:fld>
+            <a:endParaRPr lang="en-US" dirty="0"/>
+          </a:p>
+        </p:txBody>
+      </p:sp>
+    </p:spTree>
+    <p:extLst>
+      <p:ext uri="{BB962C8B-B14F-4D97-AF65-F5344CB8AC3E}">
+        <p14:creationId xmlns:p14="http://schemas.microsoft.com/office/powerpoint/2010/main" val="2970584845"/>
+      </p:ext>
+    </p:extLst>
+  </p:cSld>
+  <p:clrMapOvr>
+    <a:masterClrMapping/>
+  </p:clrMapOvr>
+</p:sld>
+</file>
+
+<file path=ppt/slides/slide8.xml><?xml version="1.0" encoding="utf-8"?>
+<p:sld xmlns:a="http://schemas.openxmlformats.org/drawingml/2006/main" xmlns:r="http://schemas.openxmlformats.org/officeDocument/2006/relationships" xmlns:p="http://schemas.openxmlformats.org/presentationml/2006/main">
+  <p:cSld>
+    <p:spTree>
+      <p:nvGrpSpPr>
+        <p:cNvPr id="1" name=""/>
+        <p:cNvGrpSpPr/>
+        <p:nvPr/>
+      </p:nvGrpSpPr>
+      <p:grpSpPr>
+        <a:xfrm>
+          <a:off x="0" y="0"/>
+          <a:ext cx="0" cy="0"/>
+          <a:chOff x="0" y="0"/>
+          <a:chExt cx="0" cy="0"/>
+        </a:xfrm>
+      </p:grpSpPr>
+      <p:sp>
+        <p:nvSpPr>
+          <p:cNvPr id="2" name="Title 1">
+            <a:extLst>
+              <a:ext uri="{FF2B5EF4-FFF2-40B4-BE49-F238E27FC236}">
+                <a16:creationId xmlns:a16="http://schemas.microsoft.com/office/drawing/2014/main" id="{FD5E8954-9BCB-7FD9-A210-38DC54382D45}"/>
+              </a:ext>
+            </a:extLst>
+          </p:cNvPr>
+          <p:cNvSpPr>
+            <a:spLocks noGrp="1"/>
+          </p:cNvSpPr>
+          <p:nvPr>
+            <p:ph type="title"/>
+          </p:nvPr>
+        </p:nvSpPr>
+        <p:spPr>
+          <a:xfrm>
+            <a:off x="3460566" y="741680"/>
+            <a:ext cx="8071034" cy="731520"/>
+          </a:xfrm>
+        </p:spPr>
+        <p:txBody>
+          <a:bodyPr/>
+          <a:lstStyle/>
+          <a:p>
+            <a:r>
+              <a:rPr lang="en-US" dirty="0"/>
+              <a:t>Azure ExpressRoute</a:t>
+            </a:r>
+          </a:p>
+        </p:txBody>
+      </p:sp>
+      <p:sp>
+        <p:nvSpPr>
+          <p:cNvPr id="3" name="Content Placeholder 2">
+            <a:extLst>
+              <a:ext uri="{FF2B5EF4-FFF2-40B4-BE49-F238E27FC236}">
+                <a16:creationId xmlns:a16="http://schemas.microsoft.com/office/drawing/2014/main" id="{75111C33-898C-4414-4665-5136EB6FC126}"/>
+              </a:ext>
+            </a:extLst>
+          </p:cNvPr>
+          <p:cNvSpPr>
+            <a:spLocks noGrp="1"/>
+          </p:cNvSpPr>
+          <p:nvPr>
+            <p:ph sz="half" idx="2"/>
+          </p:nvPr>
+        </p:nvSpPr>
+        <p:spPr>
+          <a:xfrm>
+            <a:off x="3460564" y="1757681"/>
+            <a:ext cx="8071035" cy="4043046"/>
+          </a:xfrm>
+        </p:spPr>
+        <p:txBody>
+          <a:bodyPr>
+            <a:normAutofit/>
+          </a:bodyPr>
+          <a:lstStyle/>
+          <a:p>
+            <a:r>
+              <a:rPr lang="en-US" dirty="0"/>
+              <a:t>Azure ExpressRoute is a service that provides a private connection between your on-premises infrastructure and Azure data center. This connection bypasses the public internet, offering greater reliability, faster speeds, and enhanced security. ExpressRoute is ideal for enterprises that need high-throughput, low-latency connections, or have specific compliance and security requirements.</a:t>
+            </a:r>
+          </a:p>
+          <a:p>
+            <a:endParaRPr lang="en-US" dirty="0"/>
+          </a:p>
+        </p:txBody>
+      </p:sp>
+      <p:sp>
+        <p:nvSpPr>
+          <p:cNvPr id="23" name="Slide Number Placeholder 22">
+            <a:extLst>
+              <a:ext uri="{FF2B5EF4-FFF2-40B4-BE49-F238E27FC236}">
+                <a16:creationId xmlns:a16="http://schemas.microsoft.com/office/drawing/2014/main" id="{94FF72B7-0438-3641-5939-75128934B0DF}"/>
+              </a:ext>
+            </a:extLst>
+          </p:cNvPr>
+          <p:cNvSpPr>
+            <a:spLocks noGrp="1"/>
+          </p:cNvSpPr>
+          <p:nvPr>
+            <p:ph type="sldNum" sz="quarter" idx="10"/>
+          </p:nvPr>
+        </p:nvSpPr>
+        <p:spPr/>
+        <p:txBody>
+          <a:bodyPr/>
+          <a:lstStyle/>
+          <a:p>
+            <a:fld id="{48F63A3B-78C7-47BE-AE5E-E10140E04643}" type="slidenum">
+              <a:rPr lang="en-US" smtClean="0"/>
+              <a:pPr/>
+              <a:t>8</a:t>
+            </a:fld>
+            <a:endParaRPr lang="en-US" dirty="0"/>
+          </a:p>
+        </p:txBody>
+      </p:sp>
+    </p:spTree>
+    <p:extLst>
+      <p:ext uri="{BB962C8B-B14F-4D97-AF65-F5344CB8AC3E}">
+        <p14:creationId xmlns:p14="http://schemas.microsoft.com/office/powerpoint/2010/main" val="460631551"/>
+      </p:ext>
+    </p:extLst>
+  </p:cSld>
+  <p:clrMapOvr>
+    <a:masterClrMapping/>
+  </p:clrMapOvr>
+</p:sld>
+</file>
+
+<file path=ppt/slides/slide9.xml><?xml version="1.0" encoding="utf-8"?>
+<p:sld xmlns:a="http://schemas.openxmlformats.org/drawingml/2006/main" xmlns:r="http://schemas.openxmlformats.org/officeDocument/2006/relationships" xmlns:p="http://schemas.openxmlformats.org/presentationml/2006/main">
+  <p:cSld>
+    <p:spTree>
+      <p:nvGrpSpPr>
+        <p:cNvPr id="1" name=""/>
+        <p:cNvGrpSpPr/>
+        <p:nvPr/>
+      </p:nvGrpSpPr>
+      <p:grpSpPr>
+        <a:xfrm>
+          <a:off x="0" y="0"/>
+          <a:ext cx="0" cy="0"/>
+          <a:chOff x="0" y="0"/>
+          <a:chExt cx="0" cy="0"/>
+        </a:xfrm>
+      </p:grpSpPr>
+      <p:sp>
+        <p:nvSpPr>
+          <p:cNvPr id="2" name="Title 1">
+            <a:extLst>
+              <a:ext uri="{FF2B5EF4-FFF2-40B4-BE49-F238E27FC236}">
+                <a16:creationId xmlns:a16="http://schemas.microsoft.com/office/drawing/2014/main" id="{FD5E8954-9BCB-7FD9-A210-38DC54382D45}"/>
+              </a:ext>
+            </a:extLst>
+          </p:cNvPr>
+          <p:cNvSpPr>
+            <a:spLocks noGrp="1"/>
+          </p:cNvSpPr>
+          <p:nvPr>
+            <p:ph type="title"/>
+          </p:nvPr>
+        </p:nvSpPr>
+        <p:spPr>
+          <a:xfrm>
+            <a:off x="3460566" y="741680"/>
+            <a:ext cx="8071034" cy="731520"/>
+          </a:xfrm>
+        </p:spPr>
+        <p:txBody>
+          <a:bodyPr/>
+          <a:lstStyle/>
+          <a:p>
+            <a:r>
+              <a:rPr lang="en-US" dirty="0"/>
+              <a:t>Azure Virtual Private Network (VPN)</a:t>
+            </a:r>
+          </a:p>
+        </p:txBody>
+      </p:sp>
+      <p:sp>
+        <p:nvSpPr>
+          <p:cNvPr id="3" name="Content Placeholder 2">
+            <a:extLst>
+              <a:ext uri="{FF2B5EF4-FFF2-40B4-BE49-F238E27FC236}">
+                <a16:creationId xmlns:a16="http://schemas.microsoft.com/office/drawing/2014/main" id="{75111C33-898C-4414-4665-5136EB6FC126}"/>
+              </a:ext>
+            </a:extLst>
+          </p:cNvPr>
+          <p:cNvSpPr>
+            <a:spLocks noGrp="1"/>
+          </p:cNvSpPr>
+          <p:nvPr>
+            <p:ph sz="half" idx="2"/>
+          </p:nvPr>
+        </p:nvSpPr>
+        <p:spPr>
+          <a:xfrm>
+            <a:off x="3460564" y="1757681"/>
+            <a:ext cx="8071035" cy="4043046"/>
+          </a:xfrm>
+        </p:spPr>
+        <p:txBody>
+          <a:bodyPr>
+            <a:normAutofit/>
+          </a:bodyPr>
+          <a:lstStyle/>
+          <a:p>
+            <a:r>
+              <a:rPr lang="en-US" dirty="0"/>
+              <a:t>A Virtual Private Network (VPN) is a technology that creates a secure and encrypted connection over a less secure network, such as the internet. VPNs are used by organizations and individuals to ensure data privacy, security, and seamless connectivity across different networks.</a:t>
+            </a:r>
+          </a:p>
+          <a:p>
+            <a:endParaRPr lang="en-US" dirty="0"/>
+          </a:p>
+        </p:txBody>
+      </p:sp>
+      <p:sp>
+        <p:nvSpPr>
+          <p:cNvPr id="23" name="Slide Number Placeholder 22">
+            <a:extLst>
+              <a:ext uri="{FF2B5EF4-FFF2-40B4-BE49-F238E27FC236}">
+                <a16:creationId xmlns:a16="http://schemas.microsoft.com/office/drawing/2014/main" id="{94FF72B7-0438-3641-5939-75128934B0DF}"/>
+              </a:ext>
+            </a:extLst>
+          </p:cNvPr>
+          <p:cNvSpPr>
+            <a:spLocks noGrp="1"/>
+          </p:cNvSpPr>
+          <p:nvPr>
+            <p:ph type="sldNum" sz="quarter" idx="10"/>
+          </p:nvPr>
+        </p:nvSpPr>
+        <p:spPr/>
+        <p:txBody>
+          <a:bodyPr/>
+          <a:lstStyle/>
+          <a:p>
+            <a:fld id="{48F63A3B-78C7-47BE-AE5E-E10140E04643}" type="slidenum">
+              <a:rPr lang="en-US" smtClean="0"/>
+              <a:pPr/>
+              <a:t>9</a:t>
+            </a:fld>
+            <a:endParaRPr lang="en-US" dirty="0"/>
+          </a:p>
+        </p:txBody>
+      </p:sp>
+    </p:spTree>
+    <p:extLst>
+      <p:ext uri="{BB962C8B-B14F-4D97-AF65-F5344CB8AC3E}">
+        <p14:creationId xmlns:p14="http://schemas.microsoft.com/office/powerpoint/2010/main" val="532637897"/>
       </p:ext>
     </p:extLst>
   </p:cSld>
@@ -22148,15 +23431,6 @@
 </file>
 
 <file path=customXml/item2.xml><?xml version="1.0" encoding="utf-8"?>
-<?mso-contentType ?>
-<FormTemplates xmlns="http://schemas.microsoft.com/sharepoint/v3/contenttype/forms">
-  <Display>DocumentLibraryForm</Display>
-  <Edit>DocumentLibraryForm</Edit>
-  <New>DocumentLibraryForm</New>
-</FormTemplates>
-</file>
-
-<file path=customXml/item3.xml><?xml version="1.0" encoding="utf-8"?>
 <ct:contentTypeSchema xmlns:ct="http://schemas.microsoft.com/office/2006/metadata/contentType" xmlns:ma="http://schemas.microsoft.com/office/2006/metadata/properties/metaAttributes" ct:_="" ma:_="" ma:contentTypeName="Document" ma:contentTypeID="0x01010079F111ED35F8CC479449609E8A0923A6" ma:contentTypeVersion="28" ma:contentTypeDescription="Create a new document." ma:contentTypeScope="" ma:versionID="60f5a4f2d2b0abadcf532d48ebf9cb71">
   <xsd:schema xmlns:xsd="http://www.w3.org/2001/XMLSchema" xmlns:xs="http://www.w3.org/2001/XMLSchema" xmlns:p="http://schemas.microsoft.com/office/2006/metadata/properties" xmlns:ns1="http://schemas.microsoft.com/sharepoint/v3" xmlns:ns2="71af3243-3dd4-4a8d-8c0d-dd76da1f02a5" xmlns:ns3="16c05727-aa75-4e4a-9b5f-8a80a1165891" xmlns:ns4="230e9df3-be65-4c73-a93b-d1236ebd677e" targetNamespace="http://schemas.microsoft.com/office/2006/metadata/properties" ma:root="true" ma:fieldsID="7dd78129e6a1811f84807ad11c651531" ns1:_="" ns2:_="" ns3:_="" ns4:_="">
     <xsd:import namespace="http://schemas.microsoft.com/sharepoint/v3"/>
@@ -22468,6 +23742,15 @@
 </ct:contentTypeSchema>
 </file>
 
+<file path=customXml/item3.xml><?xml version="1.0" encoding="utf-8"?>
+<?mso-contentType ?>
+<FormTemplates xmlns="http://schemas.microsoft.com/sharepoint/v3/contenttype/forms">
+  <Display>DocumentLibraryForm</Display>
+  <Edit>DocumentLibraryForm</Edit>
+  <New>DocumentLibraryForm</New>
+</FormTemplates>
+</file>
+
 <file path=customXml/itemProps1.xml><?xml version="1.0" encoding="utf-8"?>
 <ds:datastoreItem xmlns:ds="http://schemas.openxmlformats.org/officeDocument/2006/customXml" ds:itemID="{BA719FA4-954C-4FA8-82CB-206659C3B826}">
   <ds:schemaRefs>
@@ -22481,14 +23764,6 @@
 </file>
 
 <file path=customXml/itemProps2.xml><?xml version="1.0" encoding="utf-8"?>
-<ds:datastoreItem xmlns:ds="http://schemas.openxmlformats.org/officeDocument/2006/customXml" ds:itemID="{16DBB56F-4362-4386-A1A1-3DF898896616}">
-  <ds:schemaRefs>
-    <ds:schemaRef ds:uri="http://schemas.microsoft.com/sharepoint/v3/contenttype/forms"/>
-  </ds:schemaRefs>
-</ds:datastoreItem>
-</file>
-
-<file path=customXml/itemProps3.xml><?xml version="1.0" encoding="utf-8"?>
 <ds:datastoreItem xmlns:ds="http://schemas.openxmlformats.org/officeDocument/2006/customXml" ds:itemID="{04948363-B267-4BAC-8655-100FBEC280C1}">
   <ds:schemaRefs>
     <ds:schemaRef ds:uri="http://schemas.microsoft.com/office/2006/metadata/contentType"/>
@@ -22509,6 +23784,14 @@
 </ds:datastoreItem>
 </file>
 
+<file path=customXml/itemProps3.xml><?xml version="1.0" encoding="utf-8"?>
+<ds:datastoreItem xmlns:ds="http://schemas.openxmlformats.org/officeDocument/2006/customXml" ds:itemID="{16DBB56F-4362-4386-A1A1-3DF898896616}">
+  <ds:schemaRefs>
+    <ds:schemaRef ds:uri="http://schemas.microsoft.com/sharepoint/v3/contenttype/forms"/>
+  </ds:schemaRefs>
+</ds:datastoreItem>
+</file>
+
 <file path=docMetadata/LabelInfo.xml><?xml version="1.0" encoding="utf-8"?>
 <clbl:labelList xmlns:clbl="http://schemas.microsoft.com/office/2020/mipLabelMetadata"/>
 </file>
</xml_diff>

<commit_message>
changes as per new content
</commit_message>
<xml_diff>
--- a/azure-in-depth/Day-5-Azure-Networking/01-Azure-Networking.pptx
+++ b/azure-in-depth/Day-5-Azure-Networking/01-Azure-Networking.pptx
@@ -5,23 +5,24 @@
     <p:sldMasterId id="2147483693" r:id="rId4"/>
   </p:sldMasterIdLst>
   <p:notesMasterIdLst>
-    <p:notesMasterId r:id="rId16"/>
+    <p:notesMasterId r:id="rId17"/>
   </p:notesMasterIdLst>
   <p:handoutMasterIdLst>
-    <p:handoutMasterId r:id="rId17"/>
+    <p:handoutMasterId r:id="rId18"/>
   </p:handoutMasterIdLst>
   <p:sldIdLst>
     <p:sldId id="312" r:id="rId5"/>
     <p:sldId id="304" r:id="rId6"/>
     <p:sldId id="322" r:id="rId7"/>
-    <p:sldId id="337" r:id="rId8"/>
-    <p:sldId id="335" r:id="rId9"/>
-    <p:sldId id="338" r:id="rId10"/>
-    <p:sldId id="339" r:id="rId11"/>
-    <p:sldId id="340" r:id="rId12"/>
-    <p:sldId id="336" r:id="rId13"/>
-    <p:sldId id="334" r:id="rId14"/>
-    <p:sldId id="297" r:id="rId15"/>
+    <p:sldId id="341" r:id="rId8"/>
+    <p:sldId id="337" r:id="rId9"/>
+    <p:sldId id="335" r:id="rId10"/>
+    <p:sldId id="338" r:id="rId11"/>
+    <p:sldId id="339" r:id="rId12"/>
+    <p:sldId id="340" r:id="rId13"/>
+    <p:sldId id="336" r:id="rId14"/>
+    <p:sldId id="334" r:id="rId15"/>
+    <p:sldId id="297" r:id="rId16"/>
   </p:sldIdLst>
   <p:sldSz cx="12192000" cy="6858000"/>
   <p:notesSz cx="13716000" cy="24384000"/>
@@ -700,6 +701,89 @@
     </p:spTree>
     <p:extLst>
       <p:ext uri="{BB962C8B-B14F-4D97-AF65-F5344CB8AC3E}">
+        <p14:creationId xmlns:p14="http://schemas.microsoft.com/office/powerpoint/2010/main" val="1485853355"/>
+      </p:ext>
+    </p:extLst>
+  </p:cSld>
+  <p:clrMapOvr>
+    <a:masterClrMapping/>
+  </p:clrMapOvr>
+</p:notes>
+</file>
+
+<file path=ppt/notesSlides/notesSlide11.xml><?xml version="1.0" encoding="utf-8"?>
+<p:notes xmlns:a="http://schemas.openxmlformats.org/drawingml/2006/main" xmlns:r="http://schemas.openxmlformats.org/officeDocument/2006/relationships" xmlns:p="http://schemas.openxmlformats.org/presentationml/2006/main">
+  <p:cSld>
+    <p:spTree>
+      <p:nvGrpSpPr>
+        <p:cNvPr id="1" name=""/>
+        <p:cNvGrpSpPr/>
+        <p:nvPr/>
+      </p:nvGrpSpPr>
+      <p:grpSpPr>
+        <a:xfrm>
+          <a:off x="0" y="0"/>
+          <a:ext cx="0" cy="0"/>
+          <a:chOff x="0" y="0"/>
+          <a:chExt cx="0" cy="0"/>
+        </a:xfrm>
+      </p:grpSpPr>
+      <p:sp>
+        <p:nvSpPr>
+          <p:cNvPr id="2" name="Slide Image Placeholder 1"/>
+          <p:cNvSpPr>
+            <a:spLocks noGrp="1" noRot="1" noChangeAspect="1"/>
+          </p:cNvSpPr>
+          <p:nvPr>
+            <p:ph type="sldImg"/>
+          </p:nvPr>
+        </p:nvSpPr>
+        <p:spPr>
+          <a:xfrm>
+            <a:off x="-457200" y="3048000"/>
+            <a:ext cx="14630400" cy="8229600"/>
+          </a:xfrm>
+          <a:prstGeom prst="rect">
+            <a:avLst/>
+          </a:prstGeom>
+          <a:noFill/>
+          <a:ln w="12700">
+            <a:solidFill>
+              <a:prstClr val="black"/>
+            </a:solidFill>
+          </a:ln>
+        </p:spPr>
+      </p:sp>
+      <p:sp>
+        <p:nvSpPr>
+          <p:cNvPr id="3" name="Notes Placeholder 2"/>
+          <p:cNvSpPr>
+            <a:spLocks noGrp="1"/>
+          </p:cNvSpPr>
+          <p:nvPr>
+            <p:ph type="body" idx="1"/>
+          </p:nvPr>
+        </p:nvSpPr>
+        <p:spPr>
+          <a:xfrm>
+            <a:off x="1371600" y="11734800"/>
+            <a:ext cx="10972800" cy="9601200"/>
+          </a:xfrm>
+          <a:prstGeom prst="rect">
+            <a:avLst/>
+          </a:prstGeom>
+        </p:spPr>
+        <p:txBody>
+          <a:bodyPr/>
+          <a:lstStyle/>
+          <a:p>
+            <a:endParaRPr lang="en-US" dirty="0"/>
+          </a:p>
+        </p:txBody>
+      </p:sp>
+    </p:spTree>
+    <p:extLst>
+      <p:ext uri="{BB962C8B-B14F-4D97-AF65-F5344CB8AC3E}">
         <p14:creationId xmlns:p14="http://schemas.microsoft.com/office/powerpoint/2010/main" val="4163711466"/>
       </p:ext>
     </p:extLst>
@@ -710,7 +794,7 @@
 </p:notes>
 </file>
 
-<file path=ppt/notesSlides/notesSlide11.xml><?xml version="1.0" encoding="utf-8"?>
+<file path=ppt/notesSlides/notesSlide12.xml><?xml version="1.0" encoding="utf-8"?>
 <p:notes xmlns:a="http://schemas.openxmlformats.org/drawingml/2006/main" xmlns:r="http://schemas.openxmlformats.org/officeDocument/2006/relationships" xmlns:p="http://schemas.openxmlformats.org/presentationml/2006/main">
   <p:cSld>
     <p:spTree>
@@ -1032,7 +1116,7 @@
     </p:spTree>
     <p:extLst>
       <p:ext uri="{BB962C8B-B14F-4D97-AF65-F5344CB8AC3E}">
-        <p14:creationId xmlns:p14="http://schemas.microsoft.com/office/powerpoint/2010/main" val="1543512583"/>
+        <p14:creationId xmlns:p14="http://schemas.microsoft.com/office/powerpoint/2010/main" val="1085141894"/>
       </p:ext>
     </p:extLst>
   </p:cSld>
@@ -1115,7 +1199,7 @@
     </p:spTree>
     <p:extLst>
       <p:ext uri="{BB962C8B-B14F-4D97-AF65-F5344CB8AC3E}">
-        <p14:creationId xmlns:p14="http://schemas.microsoft.com/office/powerpoint/2010/main" val="1635194193"/>
+        <p14:creationId xmlns:p14="http://schemas.microsoft.com/office/powerpoint/2010/main" val="1543512583"/>
       </p:ext>
     </p:extLst>
   </p:cSld>
@@ -1198,7 +1282,7 @@
     </p:spTree>
     <p:extLst>
       <p:ext uri="{BB962C8B-B14F-4D97-AF65-F5344CB8AC3E}">
-        <p14:creationId xmlns:p14="http://schemas.microsoft.com/office/powerpoint/2010/main" val="1229688375"/>
+        <p14:creationId xmlns:p14="http://schemas.microsoft.com/office/powerpoint/2010/main" val="1635194193"/>
       </p:ext>
     </p:extLst>
   </p:cSld>
@@ -1281,7 +1365,7 @@
     </p:spTree>
     <p:extLst>
       <p:ext uri="{BB962C8B-B14F-4D97-AF65-F5344CB8AC3E}">
-        <p14:creationId xmlns:p14="http://schemas.microsoft.com/office/powerpoint/2010/main" val="1327776061"/>
+        <p14:creationId xmlns:p14="http://schemas.microsoft.com/office/powerpoint/2010/main" val="1229688375"/>
       </p:ext>
     </p:extLst>
   </p:cSld>
@@ -1364,7 +1448,7 @@
     </p:spTree>
     <p:extLst>
       <p:ext uri="{BB962C8B-B14F-4D97-AF65-F5344CB8AC3E}">
-        <p14:creationId xmlns:p14="http://schemas.microsoft.com/office/powerpoint/2010/main" val="900755096"/>
+        <p14:creationId xmlns:p14="http://schemas.microsoft.com/office/powerpoint/2010/main" val="1327776061"/>
       </p:ext>
     </p:extLst>
   </p:cSld>
@@ -1447,7 +1531,7 @@
     </p:spTree>
     <p:extLst>
       <p:ext uri="{BB962C8B-B14F-4D97-AF65-F5344CB8AC3E}">
-        <p14:creationId xmlns:p14="http://schemas.microsoft.com/office/powerpoint/2010/main" val="1485853355"/>
+        <p14:creationId xmlns:p14="http://schemas.microsoft.com/office/powerpoint/2010/main" val="900755096"/>
       </p:ext>
     </p:extLst>
   </p:cSld>
@@ -21069,6 +21153,137 @@
       </p:grpSpPr>
       <p:sp>
         <p:nvSpPr>
+          <p:cNvPr id="2" name="Title 1">
+            <a:extLst>
+              <a:ext uri="{FF2B5EF4-FFF2-40B4-BE49-F238E27FC236}">
+                <a16:creationId xmlns:a16="http://schemas.microsoft.com/office/drawing/2014/main" id="{FD5E8954-9BCB-7FD9-A210-38DC54382D45}"/>
+              </a:ext>
+            </a:extLst>
+          </p:cNvPr>
+          <p:cNvSpPr>
+            <a:spLocks noGrp="1"/>
+          </p:cNvSpPr>
+          <p:nvPr>
+            <p:ph type="title"/>
+          </p:nvPr>
+        </p:nvSpPr>
+        <p:spPr>
+          <a:xfrm>
+            <a:off x="3460566" y="741680"/>
+            <a:ext cx="8071034" cy="731520"/>
+          </a:xfrm>
+        </p:spPr>
+        <p:txBody>
+          <a:bodyPr/>
+          <a:lstStyle/>
+          <a:p>
+            <a:r>
+              <a:rPr lang="en-US" dirty="0"/>
+              <a:t>Azure Virtual Private Network (VPN)</a:t>
+            </a:r>
+          </a:p>
+        </p:txBody>
+      </p:sp>
+      <p:sp>
+        <p:nvSpPr>
+          <p:cNvPr id="3" name="Content Placeholder 2">
+            <a:extLst>
+              <a:ext uri="{FF2B5EF4-FFF2-40B4-BE49-F238E27FC236}">
+                <a16:creationId xmlns:a16="http://schemas.microsoft.com/office/drawing/2014/main" id="{75111C33-898C-4414-4665-5136EB6FC126}"/>
+              </a:ext>
+            </a:extLst>
+          </p:cNvPr>
+          <p:cNvSpPr>
+            <a:spLocks noGrp="1"/>
+          </p:cNvSpPr>
+          <p:nvPr>
+            <p:ph sz="half" idx="2"/>
+          </p:nvPr>
+        </p:nvSpPr>
+        <p:spPr>
+          <a:xfrm>
+            <a:off x="3460564" y="1757681"/>
+            <a:ext cx="8071035" cy="4043046"/>
+          </a:xfrm>
+        </p:spPr>
+        <p:txBody>
+          <a:bodyPr>
+            <a:normAutofit/>
+          </a:bodyPr>
+          <a:lstStyle/>
+          <a:p>
+            <a:r>
+              <a:rPr lang="en-US" dirty="0"/>
+              <a:t>A Virtual Private Network (VPN) is a technology that creates a secure and encrypted connection over a less secure network, such as the internet. VPNs are used by organizations and individuals to ensure data privacy, security, and seamless connectivity across different networks.</a:t>
+            </a:r>
+          </a:p>
+          <a:p>
+            <a:endParaRPr lang="en-US" dirty="0"/>
+          </a:p>
+        </p:txBody>
+      </p:sp>
+      <p:sp>
+        <p:nvSpPr>
+          <p:cNvPr id="23" name="Slide Number Placeholder 22">
+            <a:extLst>
+              <a:ext uri="{FF2B5EF4-FFF2-40B4-BE49-F238E27FC236}">
+                <a16:creationId xmlns:a16="http://schemas.microsoft.com/office/drawing/2014/main" id="{94FF72B7-0438-3641-5939-75128934B0DF}"/>
+              </a:ext>
+            </a:extLst>
+          </p:cNvPr>
+          <p:cNvSpPr>
+            <a:spLocks noGrp="1"/>
+          </p:cNvSpPr>
+          <p:nvPr>
+            <p:ph type="sldNum" sz="quarter" idx="10"/>
+          </p:nvPr>
+        </p:nvSpPr>
+        <p:spPr/>
+        <p:txBody>
+          <a:bodyPr/>
+          <a:lstStyle/>
+          <a:p>
+            <a:fld id="{48F63A3B-78C7-47BE-AE5E-E10140E04643}" type="slidenum">
+              <a:rPr lang="en-US" smtClean="0"/>
+              <a:pPr/>
+              <a:t>10</a:t>
+            </a:fld>
+            <a:endParaRPr lang="en-US" dirty="0"/>
+          </a:p>
+        </p:txBody>
+      </p:sp>
+    </p:spTree>
+    <p:extLst>
+      <p:ext uri="{BB962C8B-B14F-4D97-AF65-F5344CB8AC3E}">
+        <p14:creationId xmlns:p14="http://schemas.microsoft.com/office/powerpoint/2010/main" val="532637897"/>
+      </p:ext>
+    </p:extLst>
+  </p:cSld>
+  <p:clrMapOvr>
+    <a:masterClrMapping/>
+  </p:clrMapOvr>
+</p:sld>
+</file>
+
+<file path=ppt/slides/slide11.xml><?xml version="1.0" encoding="utf-8"?>
+<p:sld xmlns:a="http://schemas.openxmlformats.org/drawingml/2006/main" xmlns:r="http://schemas.openxmlformats.org/officeDocument/2006/relationships" xmlns:p="http://schemas.openxmlformats.org/presentationml/2006/main">
+  <p:cSld>
+    <p:spTree>
+      <p:nvGrpSpPr>
+        <p:cNvPr id="1" name=""/>
+        <p:cNvGrpSpPr/>
+        <p:nvPr/>
+      </p:nvGrpSpPr>
+      <p:grpSpPr>
+        <a:xfrm>
+          <a:off x="0" y="0"/>
+          <a:ext cx="0" cy="0"/>
+          <a:chOff x="0" y="0"/>
+          <a:chExt cx="0" cy="0"/>
+        </a:xfrm>
+      </p:grpSpPr>
+      <p:sp>
+        <p:nvSpPr>
           <p:cNvPr id="3" name="Title 2">
             <a:extLst>
               <a:ext uri="{FF2B5EF4-FFF2-40B4-BE49-F238E27FC236}">
@@ -21124,7 +21339,7 @@
             <a:fld id="{48F63A3B-78C7-47BE-AE5E-E10140E04643}" type="slidenum">
               <a:rPr lang="en-US" smtClean="0"/>
               <a:pPr/>
-              <a:t>10</a:t>
+              <a:t>11</a:t>
             </a:fld>
             <a:endParaRPr lang="en-US" dirty="0"/>
           </a:p>
@@ -21143,7 +21358,7 @@
 </p:sld>
 </file>
 
-<file path=ppt/slides/slide11.xml><?xml version="1.0" encoding="utf-8"?>
+<file path=ppt/slides/slide12.xml><?xml version="1.0" encoding="utf-8"?>
 <p:sld xmlns:a="http://schemas.openxmlformats.org/drawingml/2006/main" xmlns:r="http://schemas.openxmlformats.org/officeDocument/2006/relationships" xmlns:p="http://schemas.openxmlformats.org/presentationml/2006/main">
   <p:cSld>
     <p:spTree>
@@ -21736,8 +21951,8 @@
         </p:nvSpPr>
         <p:spPr>
           <a:xfrm>
-            <a:off x="3460566" y="741680"/>
-            <a:ext cx="8071034" cy="731520"/>
+            <a:off x="3460566" y="457199"/>
+            <a:ext cx="8071034" cy="673511"/>
           </a:xfrm>
         </p:spPr>
         <p:txBody>
@@ -21745,17 +21960,14 @@
           <a:lstStyle/>
           <a:p>
             <a:r>
-              <a:rPr lang="en-US" dirty="0"/>
-              <a:t>Azure Virtual Network (</a:t>
-            </a:r>
-            <a:r>
-              <a:rPr lang="en-US" dirty="0" err="1"/>
+              <a:rPr lang="en-IN" sz="3600" dirty="0" err="1"/>
               <a:t>VNet</a:t>
             </a:r>
             <a:r>
-              <a:rPr lang="en-US" dirty="0"/>
-              <a:t>) Connectivity</a:t>
+              <a:rPr lang="en-IN" sz="3600" dirty="0"/>
+              <a:t> Components</a:t>
             </a:r>
+            <a:endParaRPr lang="en-US" dirty="0"/>
           </a:p>
         </p:txBody>
       </p:sp>
@@ -21777,8 +21989,8 @@
         </p:nvSpPr>
         <p:spPr>
           <a:xfrm>
-            <a:off x="3460564" y="1757681"/>
-            <a:ext cx="8071035" cy="4043046"/>
+            <a:off x="3460564" y="1307690"/>
+            <a:ext cx="8071035" cy="4493037"/>
           </a:xfrm>
         </p:spPr>
         <p:txBody>
@@ -21787,67 +21999,93 @@
           </a:bodyPr>
           <a:lstStyle/>
           <a:p>
-            <a:r>
-              <a:rPr lang="en-US" dirty="0"/>
-              <a:t>Azure Virtual Network (</a:t>
-            </a:r>
-            <a:r>
-              <a:rPr lang="en-US" dirty="0" err="1"/>
-              <a:t>VNet</a:t>
-            </a:r>
-            <a:r>
-              <a:rPr lang="en-US" dirty="0"/>
-              <a:t>) connectivity allows you to connect and integrate different </a:t>
-            </a:r>
-            <a:r>
-              <a:rPr lang="en-US" dirty="0" err="1"/>
-              <a:t>VNets</a:t>
-            </a:r>
-            <a:r>
-              <a:rPr lang="en-US" dirty="0"/>
-              <a:t> to enable seamless communication between resources in your cloud environment. This can be done within the same region or across different regions globally.</a:t>
-            </a:r>
-          </a:p>
-          <a:p>
-            <a:pPr marL="400050" lvl="1" indent="0">
-              <a:buNone/>
+            <a:pPr marL="342900" indent="-342900">
+              <a:buFont typeface="Arial" panose="020B0604020202020204" pitchFamily="34" charset="0"/>
+              <a:buChar char="•"/>
             </a:pPr>
             <a:r>
-              <a:rPr lang="en-US" dirty="0"/>
-              <a:t>1) </a:t>
+              <a:rPr lang="en-IN" sz="2000" dirty="0"/>
+              <a:t>Address Space (IP)</a:t>
             </a:r>
-            <a:r>
-              <a:rPr lang="en-US" dirty="0" err="1"/>
-              <a:t>VNet</a:t>
-            </a:r>
-            <a:r>
-              <a:rPr lang="en-US" dirty="0"/>
-              <a:t> to </a:t>
-            </a:r>
-            <a:r>
-              <a:rPr lang="en-US" dirty="0" err="1"/>
-              <a:t>VNet</a:t>
-            </a:r>
-            <a:r>
-              <a:rPr lang="en-US" dirty="0"/>
-              <a:t> Peering</a:t>
-            </a:r>
-          </a:p>
-          <a:p>
-            <a:pPr marL="400050" lvl="1" indent="0">
-              <a:buNone/>
+          </a:p>
+          <a:p>
+            <a:pPr marL="342900" indent="-342900">
+              <a:buFont typeface="Arial" panose="020B0604020202020204" pitchFamily="34" charset="0"/>
+              <a:buChar char="•"/>
             </a:pPr>
             <a:r>
-              <a:rPr lang="en-US" dirty="0"/>
-              <a:t>2) Global </a:t>
+              <a:rPr lang="en-IN" sz="2000" dirty="0"/>
+              <a:t>Subnets</a:t>
             </a:r>
+          </a:p>
+          <a:p>
+            <a:pPr marL="342900" indent="-342900">
+              <a:buFont typeface="Arial" panose="020B0604020202020204" pitchFamily="34" charset="0"/>
+              <a:buChar char="•"/>
+            </a:pPr>
             <a:r>
-              <a:rPr lang="en-US" dirty="0" err="1"/>
-              <a:t>VNet</a:t>
+              <a:rPr lang="en-IN" sz="2000" dirty="0"/>
+              <a:t>Network Interface Card (NIC)</a:t>
             </a:r>
+          </a:p>
+          <a:p>
+            <a:pPr marL="342900" indent="-342900">
+              <a:buFont typeface="Arial" panose="020B0604020202020204" pitchFamily="34" charset="0"/>
+              <a:buChar char="•"/>
+            </a:pPr>
             <a:r>
-              <a:rPr lang="en-US" dirty="0"/>
-              <a:t> Peering</a:t>
+              <a:rPr lang="en-IN" sz="2000" dirty="0"/>
+              <a:t>Azure Load Balancer</a:t>
+            </a:r>
+          </a:p>
+          <a:p>
+            <a:pPr marL="342900" indent="-342900">
+              <a:buFont typeface="Arial" panose="020B0604020202020204" pitchFamily="34" charset="0"/>
+              <a:buChar char="•"/>
+            </a:pPr>
+            <a:r>
+              <a:rPr lang="en-IN" sz="2000" dirty="0"/>
+              <a:t>Application Gateway</a:t>
+            </a:r>
+          </a:p>
+          <a:p>
+            <a:pPr marL="342900" indent="-342900">
+              <a:buFont typeface="Arial" panose="020B0604020202020204" pitchFamily="34" charset="0"/>
+              <a:buChar char="•"/>
+            </a:pPr>
+            <a:r>
+              <a:rPr lang="en-IN" sz="2000" dirty="0"/>
+              <a:t>Traffic Manager</a:t>
+            </a:r>
+          </a:p>
+          <a:p>
+            <a:pPr marL="342900" indent="-342900">
+              <a:buFont typeface="Arial" panose="020B0604020202020204" pitchFamily="34" charset="0"/>
+              <a:buChar char="•"/>
+            </a:pPr>
+            <a:r>
+              <a:rPr lang="en-IN" sz="2000" dirty="0"/>
+              <a:t>Network Security Groups (NSGs)</a:t>
+            </a:r>
+          </a:p>
+          <a:p>
+            <a:pPr marL="342900" indent="-342900">
+              <a:buFont typeface="Arial" panose="020B0604020202020204" pitchFamily="34" charset="0"/>
+              <a:buChar char="•"/>
+            </a:pPr>
+            <a:r>
+              <a:rPr lang="en-IN" sz="2000" dirty="0"/>
+              <a:t>Virtual Network Peering</a:t>
+            </a:r>
+          </a:p>
+          <a:p>
+            <a:pPr marL="342900" indent="-342900">
+              <a:buFont typeface="Arial" panose="020B0604020202020204" pitchFamily="34" charset="0"/>
+              <a:buChar char="•"/>
+            </a:pPr>
+            <a:r>
+              <a:rPr lang="en-IN" sz="2000" dirty="0"/>
+              <a:t>Virtual Network Gateways</a:t>
             </a:r>
           </a:p>
           <a:p>
@@ -21888,7 +22126,7 @@
     </p:spTree>
     <p:extLst>
       <p:ext uri="{BB962C8B-B14F-4D97-AF65-F5344CB8AC3E}">
-        <p14:creationId xmlns:p14="http://schemas.microsoft.com/office/powerpoint/2010/main" val="2753983298"/>
+        <p14:creationId xmlns:p14="http://schemas.microsoft.com/office/powerpoint/2010/main" val="3959400860"/>
       </p:ext>
     </p:extLst>
   </p:cSld>
@@ -21943,13 +22181,16 @@
           <a:p>
             <a:r>
               <a:rPr lang="en-US" dirty="0"/>
-              <a:t>Azure </a:t>
+              <a:t>Azure Virtual Network (</a:t>
             </a:r>
             <a:r>
-              <a:rPr lang="en-IN" dirty="0"/>
-              <a:t>Network Interface Card (NIC)</a:t>
+              <a:rPr lang="en-US" dirty="0" err="1"/>
+              <a:t>VNet</a:t>
             </a:r>
-            <a:endParaRPr lang="en-US" dirty="0"/>
+            <a:r>
+              <a:rPr lang="en-US" dirty="0"/>
+              <a:t>) Connectivity</a:t>
+            </a:r>
           </a:p>
         </p:txBody>
       </p:sp>
@@ -21983,7 +22224,7 @@
           <a:p>
             <a:r>
               <a:rPr lang="en-US" dirty="0"/>
-              <a:t>A Network Interface Card (NIC) is a crucial component in Azure that connects a virtual machine (VM) or other Azure resources to a virtual network (</a:t>
+              <a:t>Azure Virtual Network (</a:t>
             </a:r>
             <a:r>
               <a:rPr lang="en-US" dirty="0" err="1"/>
@@ -21991,7 +22232,57 @@
             </a:r>
             <a:r>
               <a:rPr lang="en-US" dirty="0"/>
-              <a:t>). It facilitates communication between the resource and the network, allowing it to send and receive data.</a:t>
+              <a:t>) connectivity allows you to connect and integrate different </a:t>
+            </a:r>
+            <a:r>
+              <a:rPr lang="en-US" dirty="0" err="1"/>
+              <a:t>VNets</a:t>
+            </a:r>
+            <a:r>
+              <a:rPr lang="en-US" dirty="0"/>
+              <a:t> to enable seamless communication between resources in your cloud environment. This can be done within the same region or across different regions globally.</a:t>
+            </a:r>
+          </a:p>
+          <a:p>
+            <a:pPr marL="400050" lvl="1" indent="0">
+              <a:buNone/>
+            </a:pPr>
+            <a:r>
+              <a:rPr lang="en-US" dirty="0"/>
+              <a:t>1) </a:t>
+            </a:r>
+            <a:r>
+              <a:rPr lang="en-US" dirty="0" err="1"/>
+              <a:t>VNet</a:t>
+            </a:r>
+            <a:r>
+              <a:rPr lang="en-US" dirty="0"/>
+              <a:t> to </a:t>
+            </a:r>
+            <a:r>
+              <a:rPr lang="en-US" dirty="0" err="1"/>
+              <a:t>VNet</a:t>
+            </a:r>
+            <a:r>
+              <a:rPr lang="en-US" dirty="0"/>
+              <a:t> Peering</a:t>
+            </a:r>
+          </a:p>
+          <a:p>
+            <a:pPr marL="400050" lvl="1" indent="0">
+              <a:buNone/>
+            </a:pPr>
+            <a:r>
+              <a:rPr lang="en-US" dirty="0"/>
+              <a:t>2) Global </a:t>
+            </a:r>
+            <a:r>
+              <a:rPr lang="en-US" dirty="0" err="1"/>
+              <a:t>VNet</a:t>
+            </a:r>
+            <a:r>
+              <a:rPr lang="en-US" dirty="0"/>
+              <a:t> Peering</a:t>
             </a:r>
           </a:p>
           <a:p>
@@ -22032,7 +22323,7 @@
     </p:spTree>
     <p:extLst>
       <p:ext uri="{BB962C8B-B14F-4D97-AF65-F5344CB8AC3E}">
-        <p14:creationId xmlns:p14="http://schemas.microsoft.com/office/powerpoint/2010/main" val="252845630"/>
+        <p14:creationId xmlns:p14="http://schemas.microsoft.com/office/powerpoint/2010/main" val="2753983298"/>
       </p:ext>
     </p:extLst>
   </p:cSld>
@@ -22087,8 +22378,13 @@
           <a:p>
             <a:r>
               <a:rPr lang="en-US" dirty="0"/>
-              <a:t>Azure Load Balancer</a:t>
+              <a:t>Azure </a:t>
             </a:r>
+            <a:r>
+              <a:rPr lang="en-IN" dirty="0"/>
+              <a:t>Network Interface Card (NIC)</a:t>
+            </a:r>
+            <a:endParaRPr lang="en-US" dirty="0"/>
           </a:p>
         </p:txBody>
       </p:sp>
@@ -22122,8 +22418,19 @@
           <a:p>
             <a:r>
               <a:rPr lang="en-US" dirty="0"/>
-              <a:t>Azure Load Balancer is a fully managed load-balancing service that distributes incoming network traffic across multiple servers, ensuring high availability and reliability of your applications. It operates at Layer 4 (TCP, UDP) of the OSI model, providing both internal and public load balancing solutions.</a:t>
+              <a:t>A Network Interface Card (NIC) is a crucial component in Azure that connects a virtual machine (VM) or other Azure resources to a virtual network (</a:t>
             </a:r>
+            <a:r>
+              <a:rPr lang="en-US" dirty="0" err="1"/>
+              <a:t>VNet</a:t>
+            </a:r>
+            <a:r>
+              <a:rPr lang="en-US" dirty="0"/>
+              <a:t>). It facilitates communication between the resource and the network, allowing it to send and receive data.</a:t>
+            </a:r>
+          </a:p>
+          <a:p>
+            <a:endParaRPr lang="en-US" dirty="0"/>
           </a:p>
         </p:txBody>
       </p:sp>
@@ -22160,7 +22467,7 @@
     </p:spTree>
     <p:extLst>
       <p:ext uri="{BB962C8B-B14F-4D97-AF65-F5344CB8AC3E}">
-        <p14:creationId xmlns:p14="http://schemas.microsoft.com/office/powerpoint/2010/main" val="181040111"/>
+        <p14:creationId xmlns:p14="http://schemas.microsoft.com/office/powerpoint/2010/main" val="252845630"/>
       </p:ext>
     </p:extLst>
   </p:cSld>
@@ -22215,7 +22522,7 @@
           <a:p>
             <a:r>
               <a:rPr lang="en-US" dirty="0"/>
-              <a:t>Azure Traffic Manager</a:t>
+              <a:t>Azure Load Balancer</a:t>
             </a:r>
           </a:p>
         </p:txBody>
@@ -22250,11 +22557,8 @@
           <a:p>
             <a:r>
               <a:rPr lang="en-US" dirty="0"/>
-              <a:t>Azure Traffic Manager is a DNS-based global traffic distribution solution that allows you to direct user traffic to different endpoints based on various routing methods. It helps improve the availability and responsiveness of your applications by distributing traffic across multiple endpoints worldwide.</a:t>
+              <a:t>Azure Load Balancer is a fully managed load-balancing service that distributes incoming network traffic across multiple servers, ensuring high availability and reliability of your applications. It operates at Layer 4 (TCP, UDP) of the OSI model, providing both internal and public load balancing solutions.</a:t>
             </a:r>
-          </a:p>
-          <a:p>
-            <a:endParaRPr lang="en-US" dirty="0"/>
           </a:p>
         </p:txBody>
       </p:sp>
@@ -22291,7 +22595,7 @@
     </p:spTree>
     <p:extLst>
       <p:ext uri="{BB962C8B-B14F-4D97-AF65-F5344CB8AC3E}">
-        <p14:creationId xmlns:p14="http://schemas.microsoft.com/office/powerpoint/2010/main" val="2970584845"/>
+        <p14:creationId xmlns:p14="http://schemas.microsoft.com/office/powerpoint/2010/main" val="181040111"/>
       </p:ext>
     </p:extLst>
   </p:cSld>
@@ -22346,7 +22650,7 @@
           <a:p>
             <a:r>
               <a:rPr lang="en-US" dirty="0"/>
-              <a:t>Azure ExpressRoute</a:t>
+              <a:t>Azure Traffic Manager</a:t>
             </a:r>
           </a:p>
         </p:txBody>
@@ -22381,7 +22685,7 @@
           <a:p>
             <a:r>
               <a:rPr lang="en-US" dirty="0"/>
-              <a:t>Azure ExpressRoute is a service that provides a private connection between your on-premises infrastructure and Azure data center. This connection bypasses the public internet, offering greater reliability, faster speeds, and enhanced security. ExpressRoute is ideal for enterprises that need high-throughput, low-latency connections, or have specific compliance and security requirements.</a:t>
+              <a:t>Azure Traffic Manager is a DNS-based global traffic distribution solution that allows you to direct user traffic to different endpoints based on various routing methods. It helps improve the availability and responsiveness of your applications by distributing traffic across multiple endpoints worldwide.</a:t>
             </a:r>
           </a:p>
           <a:p>
@@ -22422,7 +22726,7 @@
     </p:spTree>
     <p:extLst>
       <p:ext uri="{BB962C8B-B14F-4D97-AF65-F5344CB8AC3E}">
-        <p14:creationId xmlns:p14="http://schemas.microsoft.com/office/powerpoint/2010/main" val="460631551"/>
+        <p14:creationId xmlns:p14="http://schemas.microsoft.com/office/powerpoint/2010/main" val="2970584845"/>
       </p:ext>
     </p:extLst>
   </p:cSld>
@@ -22477,7 +22781,7 @@
           <a:p>
             <a:r>
               <a:rPr lang="en-US" dirty="0"/>
-              <a:t>Azure Virtual Private Network (VPN)</a:t>
+              <a:t>Azure ExpressRoute</a:t>
             </a:r>
           </a:p>
         </p:txBody>
@@ -22512,7 +22816,7 @@
           <a:p>
             <a:r>
               <a:rPr lang="en-US" dirty="0"/>
-              <a:t>A Virtual Private Network (VPN) is a technology that creates a secure and encrypted connection over a less secure network, such as the internet. VPNs are used by organizations and individuals to ensure data privacy, security, and seamless connectivity across different networks.</a:t>
+              <a:t>Azure ExpressRoute is a service that provides a private connection between your on-premises infrastructure and Azure data center. This connection bypasses the public internet, offering greater reliability, faster speeds, and enhanced security. ExpressRoute is ideal for enterprises that need high-throughput, low-latency connections, or have specific compliance and security requirements.</a:t>
             </a:r>
           </a:p>
           <a:p>
@@ -22553,7 +22857,7 @@
     </p:spTree>
     <p:extLst>
       <p:ext uri="{BB962C8B-B14F-4D97-AF65-F5344CB8AC3E}">
-        <p14:creationId xmlns:p14="http://schemas.microsoft.com/office/powerpoint/2010/main" val="532637897"/>
+        <p14:creationId xmlns:p14="http://schemas.microsoft.com/office/powerpoint/2010/main" val="460631551"/>
       </p:ext>
     </p:extLst>
   </p:cSld>
@@ -23411,26 +23715,6 @@
 </file>
 
 <file path=customXml/item1.xml><?xml version="1.0" encoding="utf-8"?>
-<p:properties xmlns:p="http://schemas.microsoft.com/office/2006/metadata/properties" xmlns:xsi="http://www.w3.org/2001/XMLSchema-instance" xmlns:pc="http://schemas.microsoft.com/office/infopath/2007/PartnerControls">
-  <documentManagement>
-    <_ip_UnifiedCompliancePolicyUIAction xmlns="http://schemas.microsoft.com/sharepoint/v3" xsi:nil="true"/>
-    <Image xmlns="71af3243-3dd4-4a8d-8c0d-dd76da1f02a5">
-      <Url xsi:nil="true"/>
-      <Description xsi:nil="true"/>
-    </Image>
-    <Status xmlns="71af3243-3dd4-4a8d-8c0d-dd76da1f02a5">Not started</Status>
-    <Background xmlns="71af3243-3dd4-4a8d-8c0d-dd76da1f02a5">false</Background>
-    <_ip_UnifiedCompliancePolicyProperties xmlns="http://schemas.microsoft.com/sharepoint/v3" xsi:nil="true"/>
-    <ImageTagsTaxHTField xmlns="71af3243-3dd4-4a8d-8c0d-dd76da1f02a5">
-      <Terms xmlns="http://schemas.microsoft.com/office/infopath/2007/PartnerControls"/>
-    </ImageTagsTaxHTField>
-    <TaxCatchAll xmlns="230e9df3-be65-4c73-a93b-d1236ebd677e" xsi:nil="true"/>
-    <MediaServiceKeyPoints xmlns="71af3243-3dd4-4a8d-8c0d-dd76da1f02a5" xsi:nil="true"/>
-  </documentManagement>
-</p:properties>
-</file>
-
-<file path=customXml/item2.xml><?xml version="1.0" encoding="utf-8"?>
 <ct:contentTypeSchema xmlns:ct="http://schemas.microsoft.com/office/2006/metadata/contentType" xmlns:ma="http://schemas.microsoft.com/office/2006/metadata/properties/metaAttributes" ct:_="" ma:_="" ma:contentTypeName="Document" ma:contentTypeID="0x01010079F111ED35F8CC479449609E8A0923A6" ma:contentTypeVersion="28" ma:contentTypeDescription="Create a new document." ma:contentTypeScope="" ma:versionID="60f5a4f2d2b0abadcf532d48ebf9cb71">
   <xsd:schema xmlns:xsd="http://www.w3.org/2001/XMLSchema" xmlns:xs="http://www.w3.org/2001/XMLSchema" xmlns:p="http://schemas.microsoft.com/office/2006/metadata/properties" xmlns:ns1="http://schemas.microsoft.com/sharepoint/v3" xmlns:ns2="71af3243-3dd4-4a8d-8c0d-dd76da1f02a5" xmlns:ns3="16c05727-aa75-4e4a-9b5f-8a80a1165891" xmlns:ns4="230e9df3-be65-4c73-a93b-d1236ebd677e" targetNamespace="http://schemas.microsoft.com/office/2006/metadata/properties" ma:root="true" ma:fieldsID="7dd78129e6a1811f84807ad11c651531" ns1:_="" ns2:_="" ns3:_="" ns4:_="">
     <xsd:import namespace="http://schemas.microsoft.com/sharepoint/v3"/>
@@ -23742,6 +24026,26 @@
 </ct:contentTypeSchema>
 </file>
 
+<file path=customXml/item2.xml><?xml version="1.0" encoding="utf-8"?>
+<p:properties xmlns:p="http://schemas.microsoft.com/office/2006/metadata/properties" xmlns:xsi="http://www.w3.org/2001/XMLSchema-instance" xmlns:pc="http://schemas.microsoft.com/office/infopath/2007/PartnerControls">
+  <documentManagement>
+    <_ip_UnifiedCompliancePolicyUIAction xmlns="http://schemas.microsoft.com/sharepoint/v3" xsi:nil="true"/>
+    <Image xmlns="71af3243-3dd4-4a8d-8c0d-dd76da1f02a5">
+      <Url xsi:nil="true"/>
+      <Description xsi:nil="true"/>
+    </Image>
+    <Status xmlns="71af3243-3dd4-4a8d-8c0d-dd76da1f02a5">Not started</Status>
+    <Background xmlns="71af3243-3dd4-4a8d-8c0d-dd76da1f02a5">false</Background>
+    <_ip_UnifiedCompliancePolicyProperties xmlns="http://schemas.microsoft.com/sharepoint/v3" xsi:nil="true"/>
+    <ImageTagsTaxHTField xmlns="71af3243-3dd4-4a8d-8c0d-dd76da1f02a5">
+      <Terms xmlns="http://schemas.microsoft.com/office/infopath/2007/PartnerControls"/>
+    </ImageTagsTaxHTField>
+    <TaxCatchAll xmlns="230e9df3-be65-4c73-a93b-d1236ebd677e" xsi:nil="true"/>
+    <MediaServiceKeyPoints xmlns="71af3243-3dd4-4a8d-8c0d-dd76da1f02a5" xsi:nil="true"/>
+  </documentManagement>
+</p:properties>
+</file>
+
 <file path=customXml/item3.xml><?xml version="1.0" encoding="utf-8"?>
 <?mso-contentType ?>
 <FormTemplates xmlns="http://schemas.microsoft.com/sharepoint/v3/contenttype/forms">
@@ -23752,18 +24056,6 @@
 </file>
 
 <file path=customXml/itemProps1.xml><?xml version="1.0" encoding="utf-8"?>
-<ds:datastoreItem xmlns:ds="http://schemas.openxmlformats.org/officeDocument/2006/customXml" ds:itemID="{BA719FA4-954C-4FA8-82CB-206659C3B826}">
-  <ds:schemaRefs>
-    <ds:schemaRef ds:uri="http://schemas.microsoft.com/office/2006/metadata/properties"/>
-    <ds:schemaRef ds:uri="http://schemas.microsoft.com/office/infopath/2007/PartnerControls"/>
-    <ds:schemaRef ds:uri="http://schemas.microsoft.com/sharepoint/v3"/>
-    <ds:schemaRef ds:uri="71af3243-3dd4-4a8d-8c0d-dd76da1f02a5"/>
-    <ds:schemaRef ds:uri="230e9df3-be65-4c73-a93b-d1236ebd677e"/>
-  </ds:schemaRefs>
-</ds:datastoreItem>
-</file>
-
-<file path=customXml/itemProps2.xml><?xml version="1.0" encoding="utf-8"?>
 <ds:datastoreItem xmlns:ds="http://schemas.openxmlformats.org/officeDocument/2006/customXml" ds:itemID="{04948363-B267-4BAC-8655-100FBEC280C1}">
   <ds:schemaRefs>
     <ds:schemaRef ds:uri="http://schemas.microsoft.com/office/2006/metadata/contentType"/>
@@ -23784,6 +24076,18 @@
 </ds:datastoreItem>
 </file>
 
+<file path=customXml/itemProps2.xml><?xml version="1.0" encoding="utf-8"?>
+<ds:datastoreItem xmlns:ds="http://schemas.openxmlformats.org/officeDocument/2006/customXml" ds:itemID="{BA719FA4-954C-4FA8-82CB-206659C3B826}">
+  <ds:schemaRefs>
+    <ds:schemaRef ds:uri="http://schemas.microsoft.com/office/2006/metadata/properties"/>
+    <ds:schemaRef ds:uri="http://schemas.microsoft.com/office/infopath/2007/PartnerControls"/>
+    <ds:schemaRef ds:uri="http://schemas.microsoft.com/sharepoint/v3"/>
+    <ds:schemaRef ds:uri="71af3243-3dd4-4a8d-8c0d-dd76da1f02a5"/>
+    <ds:schemaRef ds:uri="230e9df3-be65-4c73-a93b-d1236ebd677e"/>
+  </ds:schemaRefs>
+</ds:datastoreItem>
+</file>
+
 <file path=customXml/itemProps3.xml><?xml version="1.0" encoding="utf-8"?>
 <ds:datastoreItem xmlns:ds="http://schemas.openxmlformats.org/officeDocument/2006/customXml" ds:itemID="{16DBB56F-4362-4386-A1A1-3DF898896616}">
   <ds:schemaRefs>

</xml_diff>